<commit_message>
Check in weekly contest
</commit_message>
<xml_diff>
--- a/Cloud/Design Principle.pptx
+++ b/Cloud/Design Principle.pptx
@@ -5,7 +5,7 @@
     <p:sldMasterId id="2147483648" r:id="rId1"/>
   </p:sldMasterIdLst>
   <p:notesMasterIdLst>
-    <p:notesMasterId r:id="rId21"/>
+    <p:notesMasterId r:id="rId23"/>
   </p:notesMasterIdLst>
   <p:sldIdLst>
     <p:sldId id="256" r:id="rId2"/>
@@ -16,17 +16,19 @@
     <p:sldId id="274" r:id="rId7"/>
     <p:sldId id="275" r:id="rId8"/>
     <p:sldId id="273" r:id="rId9"/>
-    <p:sldId id="276" r:id="rId10"/>
-    <p:sldId id="259" r:id="rId11"/>
-    <p:sldId id="261" r:id="rId12"/>
-    <p:sldId id="262" r:id="rId13"/>
-    <p:sldId id="267" r:id="rId14"/>
-    <p:sldId id="268" r:id="rId15"/>
-    <p:sldId id="263" r:id="rId16"/>
-    <p:sldId id="264" r:id="rId17"/>
-    <p:sldId id="265" r:id="rId18"/>
-    <p:sldId id="269" r:id="rId19"/>
-    <p:sldId id="266" r:id="rId20"/>
+    <p:sldId id="277" r:id="rId10"/>
+    <p:sldId id="276" r:id="rId11"/>
+    <p:sldId id="278" r:id="rId12"/>
+    <p:sldId id="259" r:id="rId13"/>
+    <p:sldId id="261" r:id="rId14"/>
+    <p:sldId id="262" r:id="rId15"/>
+    <p:sldId id="267" r:id="rId16"/>
+    <p:sldId id="268" r:id="rId17"/>
+    <p:sldId id="263" r:id="rId18"/>
+    <p:sldId id="264" r:id="rId19"/>
+    <p:sldId id="265" r:id="rId20"/>
+    <p:sldId id="269" r:id="rId21"/>
+    <p:sldId id="266" r:id="rId22"/>
   </p:sldIdLst>
   <p:sldSz cx="12192000" cy="6858000"/>
   <p:notesSz cx="6858000" cy="9144000"/>
@@ -22957,7 +22959,7 @@
           <a:p>
             <a:fld id="{AFCD47C7-CE9A-47E3-873C-B88942A7EEC6}" type="datetimeFigureOut">
               <a:rPr lang="en-US" smtClean="0"/>
-              <a:t>10/28/2023</a:t>
+              <a:t>12/28/2023</a:t>
             </a:fld>
             <a:endParaRPr lang="en-US"/>
           </a:p>
@@ -23581,7 +23583,7 @@
             <a:fld id="{B61BEF0D-F0BB-DE4B-95CE-6DB70DBA9567}" type="datetimeFigureOut">
               <a:rPr lang="en-US" dirty="0"/>
               <a:pPr/>
-              <a:t>10/28/2023</a:t>
+              <a:t>12/28/2023</a:t>
             </a:fld>
             <a:endParaRPr lang="en-US" dirty="0"/>
           </a:p>
@@ -23916,7 +23918,7 @@
             <a:fld id="{B61BEF0D-F0BB-DE4B-95CE-6DB70DBA9567}" type="datetimeFigureOut">
               <a:rPr lang="en-US" dirty="0"/>
               <a:pPr/>
-              <a:t>10/28/2023</a:t>
+              <a:t>12/28/2023</a:t>
             </a:fld>
             <a:endParaRPr lang="en-US" dirty="0"/>
           </a:p>
@@ -24314,7 +24316,7 @@
             <a:fld id="{B61BEF0D-F0BB-DE4B-95CE-6DB70DBA9567}" type="datetimeFigureOut">
               <a:rPr lang="en-US" dirty="0"/>
               <a:pPr/>
-              <a:t>10/28/2023</a:t>
+              <a:t>12/28/2023</a:t>
             </a:fld>
             <a:endParaRPr lang="en-US" dirty="0"/>
           </a:p>
@@ -24647,7 +24649,7 @@
             <a:fld id="{B61BEF0D-F0BB-DE4B-95CE-6DB70DBA9567}" type="datetimeFigureOut">
               <a:rPr lang="en-US" dirty="0"/>
               <a:pPr/>
-              <a:t>10/28/2023</a:t>
+              <a:t>12/28/2023</a:t>
             </a:fld>
             <a:endParaRPr lang="en-US" dirty="0"/>
           </a:p>
@@ -24964,7 +24966,7 @@
             <a:fld id="{B61BEF0D-F0BB-DE4B-95CE-6DB70DBA9567}" type="datetimeFigureOut">
               <a:rPr lang="en-US" dirty="0"/>
               <a:pPr/>
-              <a:t>10/28/2023</a:t>
+              <a:t>12/28/2023</a:t>
             </a:fld>
             <a:endParaRPr lang="en-US" dirty="0"/>
           </a:p>
@@ -25357,7 +25359,7 @@
             <a:fld id="{B61BEF0D-F0BB-DE4B-95CE-6DB70DBA9567}" type="datetimeFigureOut">
               <a:rPr lang="en-US" dirty="0"/>
               <a:pPr/>
-              <a:t>10/28/2023</a:t>
+              <a:t>12/28/2023</a:t>
             </a:fld>
             <a:endParaRPr lang="en-US" dirty="0"/>
           </a:p>
@@ -25611,7 +25613,7 @@
             <a:fld id="{B61BEF0D-F0BB-DE4B-95CE-6DB70DBA9567}" type="datetimeFigureOut">
               <a:rPr lang="en-US" dirty="0"/>
               <a:pPr/>
-              <a:t>10/28/2023</a:t>
+              <a:t>12/28/2023</a:t>
             </a:fld>
             <a:endParaRPr lang="en-US" dirty="0"/>
           </a:p>
@@ -25870,7 +25872,7 @@
             <a:fld id="{B61BEF0D-F0BB-DE4B-95CE-6DB70DBA9567}" type="datetimeFigureOut">
               <a:rPr lang="en-US" dirty="0"/>
               <a:pPr/>
-              <a:t>10/28/2023</a:t>
+              <a:t>12/28/2023</a:t>
             </a:fld>
             <a:endParaRPr lang="en-US" dirty="0"/>
           </a:p>
@@ -26129,7 +26131,7 @@
             <a:fld id="{B61BEF0D-F0BB-DE4B-95CE-6DB70DBA9567}" type="datetimeFigureOut">
               <a:rPr lang="en-US" dirty="0"/>
               <a:pPr/>
-              <a:t>10/28/2023</a:t>
+              <a:t>12/28/2023</a:t>
             </a:fld>
             <a:endParaRPr lang="en-US" dirty="0"/>
           </a:p>
@@ -26455,7 +26457,7 @@
             <a:fld id="{B61BEF0D-F0BB-DE4B-95CE-6DB70DBA9567}" type="datetimeFigureOut">
               <a:rPr lang="en-US" dirty="0"/>
               <a:pPr/>
-              <a:t>10/28/2023</a:t>
+              <a:t>12/28/2023</a:t>
             </a:fld>
             <a:endParaRPr lang="en-US" dirty="0"/>
           </a:p>
@@ -26775,7 +26777,7 @@
             <a:fld id="{B61BEF0D-F0BB-DE4B-95CE-6DB70DBA9567}" type="datetimeFigureOut">
               <a:rPr lang="en-US" dirty="0"/>
               <a:pPr/>
-              <a:t>10/28/2023</a:t>
+              <a:t>12/28/2023</a:t>
             </a:fld>
             <a:endParaRPr lang="en-US" dirty="0"/>
           </a:p>
@@ -27229,7 +27231,7 @@
             <a:fld id="{B61BEF0D-F0BB-DE4B-95CE-6DB70DBA9567}" type="datetimeFigureOut">
               <a:rPr lang="en-US" dirty="0"/>
               <a:pPr/>
-              <a:t>10/28/2023</a:t>
+              <a:t>12/28/2023</a:t>
             </a:fld>
             <a:endParaRPr lang="en-US" dirty="0"/>
           </a:p>
@@ -27431,7 +27433,7 @@
             <a:fld id="{B61BEF0D-F0BB-DE4B-95CE-6DB70DBA9567}" type="datetimeFigureOut">
               <a:rPr lang="en-US" dirty="0"/>
               <a:pPr/>
-              <a:t>10/28/2023</a:t>
+              <a:t>12/28/2023</a:t>
             </a:fld>
             <a:endParaRPr lang="en-US" dirty="0"/>
           </a:p>
@@ -27605,7 +27607,7 @@
             <a:fld id="{B61BEF0D-F0BB-DE4B-95CE-6DB70DBA9567}" type="datetimeFigureOut">
               <a:rPr lang="en-US" dirty="0"/>
               <a:pPr/>
-              <a:t>10/28/2023</a:t>
+              <a:t>12/28/2023</a:t>
             </a:fld>
             <a:endParaRPr lang="en-US" dirty="0"/>
           </a:p>
@@ -27935,7 +27937,7 @@
             <a:fld id="{B61BEF0D-F0BB-DE4B-95CE-6DB70DBA9567}" type="datetimeFigureOut">
               <a:rPr lang="en-US" dirty="0"/>
               <a:pPr/>
-              <a:t>10/28/2023</a:t>
+              <a:t>12/28/2023</a:t>
             </a:fld>
             <a:endParaRPr lang="en-US" dirty="0"/>
           </a:p>
@@ -28277,7 +28279,7 @@
             <a:fld id="{B61BEF0D-F0BB-DE4B-95CE-6DB70DBA9567}" type="datetimeFigureOut">
               <a:rPr lang="en-US" dirty="0"/>
               <a:pPr/>
-              <a:t>10/28/2023</a:t>
+              <a:t>12/28/2023</a:t>
             </a:fld>
             <a:endParaRPr lang="en-US" dirty="0"/>
           </a:p>
@@ -30391,7 +30393,7 @@
             <a:fld id="{B61BEF0D-F0BB-DE4B-95CE-6DB70DBA9567}" type="datetimeFigureOut">
               <a:rPr lang="en-US" dirty="0"/>
               <a:pPr/>
-              <a:t>10/28/2023</a:t>
+              <a:t>12/28/2023</a:t>
             </a:fld>
             <a:endParaRPr lang="en-US" dirty="0"/>
           </a:p>
@@ -30977,6 +30979,160 @@
 <file path=ppt/slides/slide10.xml><?xml version="1.0" encoding="utf-8"?>
 <p:sld xmlns:a="http://schemas.openxmlformats.org/drawingml/2006/main" xmlns:r="http://schemas.openxmlformats.org/officeDocument/2006/relationships" xmlns:p="http://schemas.openxmlformats.org/presentationml/2006/main">
   <p:cSld>
+    <p:spTree>
+      <p:nvGrpSpPr>
+        <p:cNvPr id="1" name=""/>
+        <p:cNvGrpSpPr/>
+        <p:nvPr/>
+      </p:nvGrpSpPr>
+      <p:grpSpPr>
+        <a:xfrm>
+          <a:off x="0" y="0"/>
+          <a:ext cx="0" cy="0"/>
+          <a:chOff x="0" y="0"/>
+          <a:chExt cx="0" cy="0"/>
+        </a:xfrm>
+      </p:grpSpPr>
+      <p:pic>
+        <p:nvPicPr>
+          <p:cNvPr id="6146" name="Picture 2">
+            <a:extLst>
+              <a:ext uri="{FF2B5EF4-FFF2-40B4-BE49-F238E27FC236}">
+                <a16:creationId xmlns:a16="http://schemas.microsoft.com/office/drawing/2014/main" id="{A6DAEB2D-AFAE-E497-6DD9-45735E1835FA}"/>
+              </a:ext>
+            </a:extLst>
+          </p:cNvPr>
+          <p:cNvPicPr>
+            <a:picLocks noChangeAspect="1" noChangeArrowheads="1"/>
+          </p:cNvPicPr>
+          <p:nvPr/>
+        </p:nvPicPr>
+        <p:blipFill>
+          <a:blip r:embed="rId2">
+            <a:extLst>
+              <a:ext uri="{28A0092B-C50C-407E-A947-70E740481C1C}">
+                <a14:useLocalDpi xmlns:a14="http://schemas.microsoft.com/office/drawing/2010/main" val="0"/>
+              </a:ext>
+            </a:extLst>
+          </a:blip>
+          <a:srcRect/>
+          <a:stretch>
+            <a:fillRect/>
+          </a:stretch>
+        </p:blipFill>
+        <p:spPr bwMode="auto">
+          <a:xfrm>
+            <a:off x="2206625" y="0"/>
+            <a:ext cx="7777163" cy="6858000"/>
+          </a:xfrm>
+          <a:prstGeom prst="rect">
+            <a:avLst/>
+          </a:prstGeom>
+          <a:noFill/>
+          <a:extLst>
+            <a:ext uri="{909E8E84-426E-40DD-AFC4-6F175D3DCCD1}">
+              <a14:hiddenFill xmlns:a14="http://schemas.microsoft.com/office/drawing/2010/main">
+                <a:solidFill>
+                  <a:srgbClr val="FFFFFF"/>
+                </a:solidFill>
+              </a14:hiddenFill>
+            </a:ext>
+          </a:extLst>
+        </p:spPr>
+      </p:pic>
+    </p:spTree>
+    <p:extLst>
+      <p:ext uri="{BB962C8B-B14F-4D97-AF65-F5344CB8AC3E}">
+        <p14:creationId xmlns:p14="http://schemas.microsoft.com/office/powerpoint/2010/main" val="978110786"/>
+      </p:ext>
+    </p:extLst>
+  </p:cSld>
+  <p:clrMapOvr>
+    <a:masterClrMapping/>
+  </p:clrMapOvr>
+</p:sld>
+</file>
+
+<file path=ppt/slides/slide11.xml><?xml version="1.0" encoding="utf-8"?>
+<p:sld xmlns:a="http://schemas.openxmlformats.org/drawingml/2006/main" xmlns:r="http://schemas.openxmlformats.org/officeDocument/2006/relationships" xmlns:p="http://schemas.openxmlformats.org/presentationml/2006/main">
+  <p:cSld>
+    <p:spTree>
+      <p:nvGrpSpPr>
+        <p:cNvPr id="1" name=""/>
+        <p:cNvGrpSpPr/>
+        <p:nvPr/>
+      </p:nvGrpSpPr>
+      <p:grpSpPr>
+        <a:xfrm>
+          <a:off x="0" y="0"/>
+          <a:ext cx="0" cy="0"/>
+          <a:chOff x="0" y="0"/>
+          <a:chExt cx="0" cy="0"/>
+        </a:xfrm>
+      </p:grpSpPr>
+      <p:pic>
+        <p:nvPicPr>
+          <p:cNvPr id="2050" name="Picture 2" descr="EP58: 10 Key Data Structures We Use Every Day - by Alex Xu">
+            <a:extLst>
+              <a:ext uri="{FF2B5EF4-FFF2-40B4-BE49-F238E27FC236}">
+                <a16:creationId xmlns:a16="http://schemas.microsoft.com/office/drawing/2014/main" id="{DDC9690B-7938-6ED3-DE5D-5898B728974F}"/>
+              </a:ext>
+            </a:extLst>
+          </p:cNvPr>
+          <p:cNvPicPr>
+            <a:picLocks noChangeAspect="1" noChangeArrowheads="1"/>
+          </p:cNvPicPr>
+          <p:nvPr/>
+        </p:nvPicPr>
+        <p:blipFill>
+          <a:blip r:embed="rId2">
+            <a:extLst>
+              <a:ext uri="{28A0092B-C50C-407E-A947-70E740481C1C}">
+                <a14:useLocalDpi xmlns:a14="http://schemas.microsoft.com/office/drawing/2010/main" val="0"/>
+              </a:ext>
+            </a:extLst>
+          </a:blip>
+          <a:srcRect/>
+          <a:stretch>
+            <a:fillRect/>
+          </a:stretch>
+        </p:blipFill>
+        <p:spPr bwMode="auto">
+          <a:xfrm>
+            <a:off x="0" y="0"/>
+            <a:ext cx="12192000" cy="6858000"/>
+          </a:xfrm>
+          <a:prstGeom prst="rect">
+            <a:avLst/>
+          </a:prstGeom>
+          <a:noFill/>
+          <a:extLst>
+            <a:ext uri="{909E8E84-426E-40DD-AFC4-6F175D3DCCD1}">
+              <a14:hiddenFill xmlns:a14="http://schemas.microsoft.com/office/drawing/2010/main">
+                <a:solidFill>
+                  <a:srgbClr val="FFFFFF"/>
+                </a:solidFill>
+              </a14:hiddenFill>
+            </a:ext>
+          </a:extLst>
+        </p:spPr>
+      </p:pic>
+    </p:spTree>
+    <p:extLst>
+      <p:ext uri="{BB962C8B-B14F-4D97-AF65-F5344CB8AC3E}">
+        <p14:creationId xmlns:p14="http://schemas.microsoft.com/office/powerpoint/2010/main" val="3591169039"/>
+      </p:ext>
+    </p:extLst>
+  </p:cSld>
+  <p:clrMapOvr>
+    <a:masterClrMapping/>
+  </p:clrMapOvr>
+</p:sld>
+</file>
+
+<file path=ppt/slides/slide12.xml><?xml version="1.0" encoding="utf-8"?>
+<p:sld xmlns:a="http://schemas.openxmlformats.org/drawingml/2006/main" xmlns:r="http://schemas.openxmlformats.org/officeDocument/2006/relationships" xmlns:p="http://schemas.openxmlformats.org/presentationml/2006/main">
+  <p:cSld>
     <p:bg>
       <p:bgPr>
         <a:gradFill rotWithShape="1">
@@ -31422,7 +31578,7 @@
 </p:sld>
 </file>
 
-<file path=ppt/slides/slide11.xml><?xml version="1.0" encoding="utf-8"?>
+<file path=ppt/slides/slide13.xml><?xml version="1.0" encoding="utf-8"?>
 <p:sld xmlns:a="http://schemas.openxmlformats.org/drawingml/2006/main" xmlns:r="http://schemas.openxmlformats.org/officeDocument/2006/relationships" xmlns:p="http://schemas.openxmlformats.org/presentationml/2006/main">
   <p:cSld>
     <p:bg>
@@ -34793,7 +34949,7 @@
 </p:sld>
 </file>
 
-<file path=ppt/slides/slide12.xml><?xml version="1.0" encoding="utf-8"?>
+<file path=ppt/slides/slide14.xml><?xml version="1.0" encoding="utf-8"?>
 <p:sld xmlns:a="http://schemas.openxmlformats.org/drawingml/2006/main" xmlns:r="http://schemas.openxmlformats.org/officeDocument/2006/relationships" xmlns:p="http://schemas.openxmlformats.org/presentationml/2006/main">
   <p:cSld>
     <p:bg>
@@ -35437,7 +35593,7 @@
 </p:sld>
 </file>
 
-<file path=ppt/slides/slide13.xml><?xml version="1.0" encoding="utf-8"?>
+<file path=ppt/slides/slide15.xml><?xml version="1.0" encoding="utf-8"?>
 <p:sld xmlns:a="http://schemas.openxmlformats.org/drawingml/2006/main" xmlns:r="http://schemas.openxmlformats.org/officeDocument/2006/relationships" xmlns:p="http://schemas.openxmlformats.org/presentationml/2006/main">
   <p:cSld>
     <p:bg>
@@ -35655,7 +35811,7 @@
 </p:sld>
 </file>
 
-<file path=ppt/slides/slide14.xml><?xml version="1.0" encoding="utf-8"?>
+<file path=ppt/slides/slide16.xml><?xml version="1.0" encoding="utf-8"?>
 <p:sld xmlns:a="http://schemas.openxmlformats.org/drawingml/2006/main" xmlns:r="http://schemas.openxmlformats.org/officeDocument/2006/relationships" xmlns:p="http://schemas.openxmlformats.org/presentationml/2006/main">
   <p:cSld>
     <p:bg>
@@ -36205,7 +36361,7 @@
 </p:sld>
 </file>
 
-<file path=ppt/slides/slide15.xml><?xml version="1.0" encoding="utf-8"?>
+<file path=ppt/slides/slide17.xml><?xml version="1.0" encoding="utf-8"?>
 <p:sld xmlns:a="http://schemas.openxmlformats.org/drawingml/2006/main" xmlns:r="http://schemas.openxmlformats.org/officeDocument/2006/relationships" xmlns:p="http://schemas.openxmlformats.org/presentationml/2006/main">
   <p:cSld>
     <p:bg>
@@ -36653,7 +36809,7 @@
 </p:sld>
 </file>
 
-<file path=ppt/slides/slide16.xml><?xml version="1.0" encoding="utf-8"?>
+<file path=ppt/slides/slide18.xml><?xml version="1.0" encoding="utf-8"?>
 <p:sld xmlns:a="http://schemas.openxmlformats.org/drawingml/2006/main" xmlns:r="http://schemas.openxmlformats.org/officeDocument/2006/relationships" xmlns:p="http://schemas.openxmlformats.org/presentationml/2006/main">
   <p:cSld>
     <p:bg>
@@ -36821,7 +36977,7 @@
 </p:sld>
 </file>
 
-<file path=ppt/slides/slide17.xml><?xml version="1.0" encoding="utf-8"?>
+<file path=ppt/slides/slide19.xml><?xml version="1.0" encoding="utf-8"?>
 <p:sld xmlns:a="http://schemas.openxmlformats.org/drawingml/2006/main" xmlns:r="http://schemas.openxmlformats.org/officeDocument/2006/relationships" xmlns:p="http://schemas.openxmlformats.org/presentationml/2006/main">
   <p:cSld>
     <p:bg>
@@ -37260,902 +37416,6 @@
     <p:extLst>
       <p:ext uri="{BB962C8B-B14F-4D97-AF65-F5344CB8AC3E}">
         <p14:creationId xmlns:p14="http://schemas.microsoft.com/office/powerpoint/2010/main" val="1430944752"/>
-      </p:ext>
-    </p:extLst>
-  </p:cSld>
-  <p:clrMapOvr>
-    <a:masterClrMapping/>
-  </p:clrMapOvr>
-</p:sld>
-</file>
-
-<file path=ppt/slides/slide18.xml><?xml version="1.0" encoding="utf-8"?>
-<p:sld xmlns:a="http://schemas.openxmlformats.org/drawingml/2006/main" xmlns:r="http://schemas.openxmlformats.org/officeDocument/2006/relationships" xmlns:p="http://schemas.openxmlformats.org/presentationml/2006/main">
-  <p:cSld>
-    <p:bg>
-      <p:bgPr>
-        <a:gradFill rotWithShape="1">
-          <a:gsLst>
-            <a:gs pos="0">
-              <a:schemeClr val="bg2">
-                <a:tint val="90000"/>
-                <a:satMod val="92000"/>
-                <a:lumMod val="120000"/>
-              </a:schemeClr>
-            </a:gs>
-            <a:gs pos="100000">
-              <a:schemeClr val="bg2">
-                <a:shade val="98000"/>
-                <a:satMod val="120000"/>
-                <a:lumMod val="98000"/>
-              </a:schemeClr>
-            </a:gs>
-          </a:gsLst>
-          <a:path path="circle">
-            <a:fillToRect l="50000" t="50000" r="100000" b="100000"/>
-          </a:path>
-        </a:gradFill>
-        <a:effectLst/>
-      </p:bgPr>
-    </p:bg>
-    <p:spTree>
-      <p:nvGrpSpPr>
-        <p:cNvPr id="1" name=""/>
-        <p:cNvGrpSpPr/>
-        <p:nvPr/>
-      </p:nvGrpSpPr>
-      <p:grpSpPr>
-        <a:xfrm>
-          <a:off x="0" y="0"/>
-          <a:ext cx="0" cy="0"/>
-          <a:chOff x="0" y="0"/>
-          <a:chExt cx="0" cy="0"/>
-        </a:xfrm>
-      </p:grpSpPr>
-      <p:sp>
-        <p:nvSpPr>
-          <p:cNvPr id="10" name="Rectangle 9">
-            <a:extLst>
-              <a:ext uri="{FF2B5EF4-FFF2-40B4-BE49-F238E27FC236}">
-                <a16:creationId xmlns:a16="http://schemas.microsoft.com/office/drawing/2014/main" id="{A3D9AEEE-1CCD-43C0-BA3E-16D60A6E23C0}"/>
-              </a:ext>
-              <a:ext uri="{C183D7F6-B498-43B3-948B-1728B52AA6E4}">
-                <adec:decorative xmlns:adec="http://schemas.microsoft.com/office/drawing/2017/decorative" val="1"/>
-              </a:ext>
-            </a:extLst>
-          </p:cNvPr>
-          <p:cNvSpPr>
-            <a:spLocks noGrp="1" noRot="1" noChangeAspect="1" noMove="1" noResize="1" noEditPoints="1" noAdjustHandles="1" noChangeArrowheads="1" noChangeShapeType="1" noTextEdit="1"/>
-          </p:cNvSpPr>
-          <p:nvPr>
-            <p:extLst>
-              <p:ext uri="{386F3935-93C4-4BCD-93E2-E3B085C9AB24}">
-                <p16:designElem xmlns:p16="http://schemas.microsoft.com/office/powerpoint/2015/main" val="1"/>
-              </p:ext>
-            </p:extLst>
-          </p:nvPr>
-        </p:nvSpPr>
-        <p:spPr>
-          <a:xfrm>
-            <a:off x="1" y="0"/>
-            <a:ext cx="4059079" cy="6858000"/>
-          </a:xfrm>
-          <a:prstGeom prst="rect">
-            <a:avLst/>
-          </a:prstGeom>
-          <a:solidFill>
-            <a:schemeClr val="tx2"/>
-          </a:solidFill>
-          <a:ln>
-            <a:noFill/>
-          </a:ln>
-        </p:spPr>
-        <p:style>
-          <a:lnRef idx="2">
-            <a:schemeClr val="accent1">
-              <a:shade val="50000"/>
-            </a:schemeClr>
-          </a:lnRef>
-          <a:fillRef idx="1">
-            <a:schemeClr val="accent1"/>
-          </a:fillRef>
-          <a:effectRef idx="0">
-            <a:schemeClr val="accent1"/>
-          </a:effectRef>
-          <a:fontRef idx="minor">
-            <a:schemeClr val="lt1"/>
-          </a:fontRef>
-        </p:style>
-        <p:txBody>
-          <a:bodyPr rtlCol="0" anchor="ctr"/>
-          <a:lstStyle/>
-          <a:p>
-            <a:pPr algn="ctr"/>
-            <a:endParaRPr lang="en-US"/>
-          </a:p>
-        </p:txBody>
-      </p:sp>
-      <p:sp>
-        <p:nvSpPr>
-          <p:cNvPr id="2" name="Title 1">
-            <a:extLst>
-              <a:ext uri="{FF2B5EF4-FFF2-40B4-BE49-F238E27FC236}">
-                <a16:creationId xmlns:a16="http://schemas.microsoft.com/office/drawing/2014/main" id="{B6FCBFED-801E-4AEB-9456-FAF14E81A7C2}"/>
-              </a:ext>
-            </a:extLst>
-          </p:cNvPr>
-          <p:cNvSpPr>
-            <a:spLocks noGrp="1"/>
-          </p:cNvSpPr>
-          <p:nvPr>
-            <p:ph type="title"/>
-          </p:nvPr>
-        </p:nvSpPr>
-        <p:spPr>
-          <a:xfrm>
-            <a:off x="1259893" y="3101093"/>
-            <a:ext cx="2454052" cy="3029344"/>
-          </a:xfrm>
-        </p:spPr>
-        <p:txBody>
-          <a:bodyPr>
-            <a:normAutofit/>
-          </a:bodyPr>
-          <a:lstStyle/>
-          <a:p>
-            <a:r>
-              <a:rPr lang="en-US" sz="3000">
-                <a:solidFill>
-                  <a:schemeClr val="bg1"/>
-                </a:solidFill>
-              </a:rPr>
-              <a:t>Data Consistency</a:t>
-            </a:r>
-          </a:p>
-        </p:txBody>
-      </p:sp>
-      <p:sp>
-        <p:nvSpPr>
-          <p:cNvPr id="12" name="Freeform 11">
-            <a:extLst>
-              <a:ext uri="{FF2B5EF4-FFF2-40B4-BE49-F238E27FC236}">
-                <a16:creationId xmlns:a16="http://schemas.microsoft.com/office/drawing/2014/main" id="{60F880A6-33D3-4EEC-A780-B73559B9F24C}"/>
-              </a:ext>
-              <a:ext uri="{C183D7F6-B498-43B3-948B-1728B52AA6E4}">
-                <adec:decorative xmlns:adec="http://schemas.microsoft.com/office/drawing/2017/decorative" val="1"/>
-              </a:ext>
-            </a:extLst>
-          </p:cNvPr>
-          <p:cNvSpPr>
-            <a:spLocks noGrp="1" noRot="1" noChangeAspect="1" noMove="1" noResize="1" noEditPoints="1" noAdjustHandles="1" noChangeArrowheads="1" noChangeShapeType="1" noTextEdit="1"/>
-          </p:cNvSpPr>
-          <p:nvPr>
-            <p:extLst>
-              <p:ext uri="{386F3935-93C4-4BCD-93E2-E3B085C9AB24}">
-                <p16:designElem xmlns:p16="http://schemas.microsoft.com/office/powerpoint/2015/main" val="1"/>
-              </p:ext>
-            </p:extLst>
-          </p:nvPr>
-        </p:nvSpPr>
-        <p:spPr bwMode="auto">
-          <a:xfrm flipV="1">
-            <a:off x="-159" y="3179901"/>
-            <a:ext cx="1098194" cy="514066"/>
-          </a:xfrm>
-          <a:custGeom>
-            <a:avLst/>
-            <a:gdLst>
-              <a:gd name="connsiteX0" fmla="*/ 10000 w 10044"/>
-              <a:gd name="connsiteY0" fmla="*/ 4701 h 9966"/>
-              <a:gd name="connsiteX1" fmla="*/ 8559 w 10044"/>
-              <a:gd name="connsiteY1" fmla="*/ 188 h 9966"/>
-              <a:gd name="connsiteX2" fmla="*/ 8527 w 10044"/>
-              <a:gd name="connsiteY2" fmla="*/ 94 h 9966"/>
-              <a:gd name="connsiteX3" fmla="*/ 8438 w 10044"/>
-              <a:gd name="connsiteY3" fmla="*/ 0 h 9966"/>
-              <a:gd name="connsiteX4" fmla="*/ 7867 w 10044"/>
-              <a:gd name="connsiteY4" fmla="*/ 0 h 9966"/>
-              <a:gd name="connsiteX5" fmla="*/ 0 w 10044"/>
-              <a:gd name="connsiteY5" fmla="*/ 70 h 9966"/>
-              <a:gd name="connsiteX6" fmla="*/ 3132 w 10044"/>
-              <a:gd name="connsiteY6" fmla="*/ 9763 h 9966"/>
-              <a:gd name="connsiteX7" fmla="*/ 7867 w 10044"/>
-              <a:gd name="connsiteY7" fmla="*/ 9966 h 9966"/>
-              <a:gd name="connsiteX8" fmla="*/ 8438 w 10044"/>
-              <a:gd name="connsiteY8" fmla="*/ 9966 h 9966"/>
-              <a:gd name="connsiteX9" fmla="*/ 8527 w 10044"/>
-              <a:gd name="connsiteY9" fmla="*/ 9872 h 9966"/>
-              <a:gd name="connsiteX10" fmla="*/ 8559 w 10044"/>
-              <a:gd name="connsiteY10" fmla="*/ 9778 h 9966"/>
-              <a:gd name="connsiteX11" fmla="*/ 10000 w 10044"/>
-              <a:gd name="connsiteY11" fmla="*/ 5265 h 9966"/>
-              <a:gd name="connsiteX12" fmla="*/ 10000 w 10044"/>
-              <a:gd name="connsiteY12" fmla="*/ 4701 h 9966"/>
-              <a:gd name="connsiteX0" fmla="*/ 6839 w 6883"/>
-              <a:gd name="connsiteY0" fmla="*/ 4885 h 10168"/>
-              <a:gd name="connsiteX1" fmla="*/ 5405 w 6883"/>
-              <a:gd name="connsiteY1" fmla="*/ 357 h 10168"/>
-              <a:gd name="connsiteX2" fmla="*/ 5373 w 6883"/>
-              <a:gd name="connsiteY2" fmla="*/ 262 h 10168"/>
-              <a:gd name="connsiteX3" fmla="*/ 5284 w 6883"/>
-              <a:gd name="connsiteY3" fmla="*/ 168 h 10168"/>
-              <a:gd name="connsiteX4" fmla="*/ 4716 w 6883"/>
-              <a:gd name="connsiteY4" fmla="*/ 168 h 10168"/>
-              <a:gd name="connsiteX5" fmla="*/ 50 w 6883"/>
-              <a:gd name="connsiteY5" fmla="*/ 0 h 10168"/>
-              <a:gd name="connsiteX6" fmla="*/ 1 w 6883"/>
-              <a:gd name="connsiteY6" fmla="*/ 9964 h 10168"/>
-              <a:gd name="connsiteX7" fmla="*/ 4716 w 6883"/>
-              <a:gd name="connsiteY7" fmla="*/ 10168 h 10168"/>
-              <a:gd name="connsiteX8" fmla="*/ 5284 w 6883"/>
-              <a:gd name="connsiteY8" fmla="*/ 10168 h 10168"/>
-              <a:gd name="connsiteX9" fmla="*/ 5373 w 6883"/>
-              <a:gd name="connsiteY9" fmla="*/ 10074 h 10168"/>
-              <a:gd name="connsiteX10" fmla="*/ 5405 w 6883"/>
-              <a:gd name="connsiteY10" fmla="*/ 9979 h 10168"/>
-              <a:gd name="connsiteX11" fmla="*/ 6839 w 6883"/>
-              <a:gd name="connsiteY11" fmla="*/ 5451 h 10168"/>
-              <a:gd name="connsiteX12" fmla="*/ 6839 w 6883"/>
-              <a:gd name="connsiteY12" fmla="*/ 4885 h 10168"/>
-            </a:gdLst>
-            <a:ahLst/>
-            <a:cxnLst>
-              <a:cxn ang="0">
-                <a:pos x="connsiteX0" y="connsiteY0"/>
-              </a:cxn>
-              <a:cxn ang="0">
-                <a:pos x="connsiteX1" y="connsiteY1"/>
-              </a:cxn>
-              <a:cxn ang="0">
-                <a:pos x="connsiteX2" y="connsiteY2"/>
-              </a:cxn>
-              <a:cxn ang="0">
-                <a:pos x="connsiteX3" y="connsiteY3"/>
-              </a:cxn>
-              <a:cxn ang="0">
-                <a:pos x="connsiteX4" y="connsiteY4"/>
-              </a:cxn>
-              <a:cxn ang="0">
-                <a:pos x="connsiteX5" y="connsiteY5"/>
-              </a:cxn>
-              <a:cxn ang="0">
-                <a:pos x="connsiteX6" y="connsiteY6"/>
-              </a:cxn>
-              <a:cxn ang="0">
-                <a:pos x="connsiteX7" y="connsiteY7"/>
-              </a:cxn>
-              <a:cxn ang="0">
-                <a:pos x="connsiteX8" y="connsiteY8"/>
-              </a:cxn>
-              <a:cxn ang="0">
-                <a:pos x="connsiteX9" y="connsiteY9"/>
-              </a:cxn>
-              <a:cxn ang="0">
-                <a:pos x="connsiteX10" y="connsiteY10"/>
-              </a:cxn>
-              <a:cxn ang="0">
-                <a:pos x="connsiteX11" y="connsiteY11"/>
-              </a:cxn>
-              <a:cxn ang="0">
-                <a:pos x="connsiteX12" y="connsiteY12"/>
-              </a:cxn>
-            </a:cxnLst>
-            <a:rect l="l" t="t" r="r" b="b"/>
-            <a:pathLst>
-              <a:path w="6883" h="10168">
-                <a:moveTo>
-                  <a:pt x="6839" y="4885"/>
-                </a:moveTo>
-                <a:lnTo>
-                  <a:pt x="5405" y="357"/>
-                </a:lnTo>
-                <a:cubicBezTo>
-                  <a:pt x="5395" y="325"/>
-                  <a:pt x="5383" y="294"/>
-                  <a:pt x="5373" y="262"/>
-                </a:cubicBezTo>
-                <a:cubicBezTo>
-                  <a:pt x="5344" y="168"/>
-                  <a:pt x="5314" y="168"/>
-                  <a:pt x="5284" y="168"/>
-                </a:cubicBezTo>
-                <a:lnTo>
-                  <a:pt x="4716" y="168"/>
-                </a:lnTo>
-                <a:lnTo>
-                  <a:pt x="50" y="0"/>
-                </a:lnTo>
-                <a:cubicBezTo>
-                  <a:pt x="59" y="3322"/>
-                  <a:pt x="-8" y="6643"/>
-                  <a:pt x="1" y="9964"/>
-                </a:cubicBezTo>
-                <a:lnTo>
-                  <a:pt x="4716" y="10168"/>
-                </a:lnTo>
-                <a:lnTo>
-                  <a:pt x="5284" y="10168"/>
-                </a:lnTo>
-                <a:cubicBezTo>
-                  <a:pt x="5314" y="10168"/>
-                  <a:pt x="5344" y="10074"/>
-                  <a:pt x="5373" y="10074"/>
-                </a:cubicBezTo>
-                <a:cubicBezTo>
-                  <a:pt x="5373" y="9979"/>
-                  <a:pt x="5405" y="9979"/>
-                  <a:pt x="5405" y="9979"/>
-                </a:cubicBezTo>
-                <a:lnTo>
-                  <a:pt x="6839" y="5451"/>
-                </a:lnTo>
-                <a:cubicBezTo>
-                  <a:pt x="6898" y="5262"/>
-                  <a:pt x="6898" y="5074"/>
-                  <a:pt x="6839" y="4885"/>
-                </a:cubicBezTo>
-                <a:close/>
-              </a:path>
-            </a:pathLst>
-          </a:custGeom>
-          <a:solidFill>
-            <a:schemeClr val="accent1"/>
-          </a:solidFill>
-          <a:ln>
-            <a:noFill/>
-          </a:ln>
-        </p:spPr>
-        <p:txBody>
-          <a:bodyPr/>
-          <a:lstStyle/>
-          <a:p>
-            <a:endParaRPr lang="en-US"/>
-          </a:p>
-        </p:txBody>
-      </p:sp>
-      <p:sp useBgFill="1">
-        <p:nvSpPr>
-          <p:cNvPr id="14" name="Rectangle 13">
-            <a:extLst>
-              <a:ext uri="{FF2B5EF4-FFF2-40B4-BE49-F238E27FC236}">
-                <a16:creationId xmlns:a16="http://schemas.microsoft.com/office/drawing/2014/main" id="{2C6246ED-0535-4496-A8F6-1E80CC4EB853}"/>
-              </a:ext>
-              <a:ext uri="{C183D7F6-B498-43B3-948B-1728B52AA6E4}">
-                <adec:decorative xmlns:adec="http://schemas.microsoft.com/office/drawing/2017/decorative" val="1"/>
-              </a:ext>
-            </a:extLst>
-          </p:cNvPr>
-          <p:cNvSpPr>
-            <a:spLocks noGrp="1" noRot="1" noChangeAspect="1" noMove="1" noResize="1" noEditPoints="1" noAdjustHandles="1" noChangeArrowheads="1" noChangeShapeType="1" noTextEdit="1"/>
-          </p:cNvSpPr>
-          <p:nvPr>
-            <p:extLst>
-              <p:ext uri="{386F3935-93C4-4BCD-93E2-E3B085C9AB24}">
-                <p16:designElem xmlns:p16="http://schemas.microsoft.com/office/powerpoint/2015/main" val="1"/>
-              </p:ext>
-            </p:extLst>
-          </p:nvPr>
-        </p:nvSpPr>
-        <p:spPr>
-          <a:xfrm>
-            <a:off x="4795736" y="0"/>
-            <a:ext cx="7396264" cy="6858000"/>
-          </a:xfrm>
-          <a:prstGeom prst="rect">
-            <a:avLst/>
-          </a:prstGeom>
-          <a:ln>
-            <a:noFill/>
-          </a:ln>
-        </p:spPr>
-        <p:style>
-          <a:lnRef idx="2">
-            <a:schemeClr val="accent1">
-              <a:shade val="50000"/>
-            </a:schemeClr>
-          </a:lnRef>
-          <a:fillRef idx="1">
-            <a:schemeClr val="accent1"/>
-          </a:fillRef>
-          <a:effectRef idx="0">
-            <a:schemeClr val="accent1"/>
-          </a:effectRef>
-          <a:fontRef idx="minor">
-            <a:schemeClr val="lt1"/>
-          </a:fontRef>
-        </p:style>
-        <p:txBody>
-          <a:bodyPr rtlCol="0" anchor="ctr"/>
-          <a:lstStyle/>
-          <a:p>
-            <a:pPr algn="ctr"/>
-            <a:endParaRPr lang="en-US"/>
-          </a:p>
-        </p:txBody>
-      </p:sp>
-      <p:graphicFrame>
-        <p:nvGraphicFramePr>
-          <p:cNvPr id="5" name="Content Placeholder 2">
-            <a:extLst>
-              <a:ext uri="{FF2B5EF4-FFF2-40B4-BE49-F238E27FC236}">
-                <a16:creationId xmlns:a16="http://schemas.microsoft.com/office/drawing/2014/main" id="{72980326-5E19-4FB4-9720-2E3D33DC5B35}"/>
-              </a:ext>
-            </a:extLst>
-          </p:cNvPr>
-          <p:cNvGraphicFramePr>
-            <a:graphicFrameLocks noGrp="1"/>
-          </p:cNvGraphicFramePr>
-          <p:nvPr>
-            <p:ph idx="1"/>
-            <p:extLst>
-              <p:ext uri="{D42A27DB-BD31-4B8C-83A1-F6EECF244321}">
-                <p14:modId xmlns:p14="http://schemas.microsoft.com/office/powerpoint/2010/main" val="548616360"/>
-              </p:ext>
-            </p:extLst>
-          </p:nvPr>
-        </p:nvGraphicFramePr>
-        <p:xfrm>
-          <a:off x="4713144" y="641551"/>
-          <a:ext cx="6832212" cy="5264779"/>
-        </p:xfrm>
-        <a:graphic>
-          <a:graphicData uri="http://schemas.openxmlformats.org/drawingml/2006/diagram">
-            <dgm:relIds xmlns:dgm="http://schemas.openxmlformats.org/drawingml/2006/diagram" xmlns:r="http://schemas.openxmlformats.org/officeDocument/2006/relationships" r:dm="rId2" r:lo="rId3" r:qs="rId4" r:cs="rId5"/>
-          </a:graphicData>
-        </a:graphic>
-      </p:graphicFrame>
-    </p:spTree>
-    <p:extLst>
-      <p:ext uri="{BB962C8B-B14F-4D97-AF65-F5344CB8AC3E}">
-        <p14:creationId xmlns:p14="http://schemas.microsoft.com/office/powerpoint/2010/main" val="599986821"/>
-      </p:ext>
-    </p:extLst>
-  </p:cSld>
-  <p:clrMapOvr>
-    <a:masterClrMapping/>
-  </p:clrMapOvr>
-</p:sld>
-</file>
-
-<file path=ppt/slides/slide19.xml><?xml version="1.0" encoding="utf-8"?>
-<p:sld xmlns:a="http://schemas.openxmlformats.org/drawingml/2006/main" xmlns:r="http://schemas.openxmlformats.org/officeDocument/2006/relationships" xmlns:p="http://schemas.openxmlformats.org/presentationml/2006/main">
-  <p:cSld>
-    <p:bg>
-      <p:bgPr>
-        <a:gradFill rotWithShape="1">
-          <a:gsLst>
-            <a:gs pos="0">
-              <a:schemeClr val="bg2">
-                <a:tint val="90000"/>
-                <a:satMod val="92000"/>
-                <a:lumMod val="120000"/>
-              </a:schemeClr>
-            </a:gs>
-            <a:gs pos="100000">
-              <a:schemeClr val="bg2">
-                <a:shade val="98000"/>
-                <a:satMod val="120000"/>
-                <a:lumMod val="98000"/>
-              </a:schemeClr>
-            </a:gs>
-          </a:gsLst>
-          <a:path path="circle">
-            <a:fillToRect l="50000" t="50000" r="100000" b="100000"/>
-          </a:path>
-        </a:gradFill>
-        <a:effectLst/>
-      </p:bgPr>
-    </p:bg>
-    <p:spTree>
-      <p:nvGrpSpPr>
-        <p:cNvPr id="1" name=""/>
-        <p:cNvGrpSpPr/>
-        <p:nvPr/>
-      </p:nvGrpSpPr>
-      <p:grpSpPr>
-        <a:xfrm>
-          <a:off x="0" y="0"/>
-          <a:ext cx="0" cy="0"/>
-          <a:chOff x="0" y="0"/>
-          <a:chExt cx="0" cy="0"/>
-        </a:xfrm>
-      </p:grpSpPr>
-      <p:sp>
-        <p:nvSpPr>
-          <p:cNvPr id="10" name="Rectangle 9">
-            <a:extLst>
-              <a:ext uri="{FF2B5EF4-FFF2-40B4-BE49-F238E27FC236}">
-                <a16:creationId xmlns:a16="http://schemas.microsoft.com/office/drawing/2014/main" id="{A3D9AEEE-1CCD-43C0-BA3E-16D60A6E23C0}"/>
-              </a:ext>
-              <a:ext uri="{C183D7F6-B498-43B3-948B-1728B52AA6E4}">
-                <adec:decorative xmlns:adec="http://schemas.microsoft.com/office/drawing/2017/decorative" val="1"/>
-              </a:ext>
-            </a:extLst>
-          </p:cNvPr>
-          <p:cNvSpPr>
-            <a:spLocks noGrp="1" noRot="1" noChangeAspect="1" noMove="1" noResize="1" noEditPoints="1" noAdjustHandles="1" noChangeArrowheads="1" noChangeShapeType="1" noTextEdit="1"/>
-          </p:cNvSpPr>
-          <p:nvPr>
-            <p:extLst>
-              <p:ext uri="{386F3935-93C4-4BCD-93E2-E3B085C9AB24}">
-                <p16:designElem xmlns:p16="http://schemas.microsoft.com/office/powerpoint/2015/main" val="1"/>
-              </p:ext>
-            </p:extLst>
-          </p:nvPr>
-        </p:nvSpPr>
-        <p:spPr>
-          <a:xfrm>
-            <a:off x="1" y="0"/>
-            <a:ext cx="4059079" cy="6858000"/>
-          </a:xfrm>
-          <a:prstGeom prst="rect">
-            <a:avLst/>
-          </a:prstGeom>
-          <a:solidFill>
-            <a:schemeClr val="tx2"/>
-          </a:solidFill>
-          <a:ln>
-            <a:noFill/>
-          </a:ln>
-        </p:spPr>
-        <p:style>
-          <a:lnRef idx="2">
-            <a:schemeClr val="accent1">
-              <a:shade val="50000"/>
-            </a:schemeClr>
-          </a:lnRef>
-          <a:fillRef idx="1">
-            <a:schemeClr val="accent1"/>
-          </a:fillRef>
-          <a:effectRef idx="0">
-            <a:schemeClr val="accent1"/>
-          </a:effectRef>
-          <a:fontRef idx="minor">
-            <a:schemeClr val="lt1"/>
-          </a:fontRef>
-        </p:style>
-        <p:txBody>
-          <a:bodyPr rtlCol="0" anchor="ctr"/>
-          <a:lstStyle/>
-          <a:p>
-            <a:pPr algn="ctr"/>
-            <a:endParaRPr lang="en-US"/>
-          </a:p>
-        </p:txBody>
-      </p:sp>
-      <p:sp>
-        <p:nvSpPr>
-          <p:cNvPr id="2" name="Title 1">
-            <a:extLst>
-              <a:ext uri="{FF2B5EF4-FFF2-40B4-BE49-F238E27FC236}">
-                <a16:creationId xmlns:a16="http://schemas.microsoft.com/office/drawing/2014/main" id="{FF56FC2A-20F4-4F0D-A8C8-0491168DC201}"/>
-              </a:ext>
-            </a:extLst>
-          </p:cNvPr>
-          <p:cNvSpPr>
-            <a:spLocks noGrp="1"/>
-          </p:cNvSpPr>
-          <p:nvPr>
-            <p:ph type="title"/>
-          </p:nvPr>
-        </p:nvSpPr>
-        <p:spPr>
-          <a:xfrm>
-            <a:off x="1259893" y="3101093"/>
-            <a:ext cx="2454052" cy="3029344"/>
-          </a:xfrm>
-        </p:spPr>
-        <p:txBody>
-          <a:bodyPr>
-            <a:normAutofit/>
-          </a:bodyPr>
-          <a:lstStyle/>
-          <a:p>
-            <a:r>
-              <a:rPr lang="en-US" sz="3200">
-                <a:solidFill>
-                  <a:schemeClr val="bg1"/>
-                </a:solidFill>
-              </a:rPr>
-              <a:t>Operation</a:t>
-            </a:r>
-          </a:p>
-        </p:txBody>
-      </p:sp>
-      <p:sp>
-        <p:nvSpPr>
-          <p:cNvPr id="12" name="Freeform 11">
-            <a:extLst>
-              <a:ext uri="{FF2B5EF4-FFF2-40B4-BE49-F238E27FC236}">
-                <a16:creationId xmlns:a16="http://schemas.microsoft.com/office/drawing/2014/main" id="{60F880A6-33D3-4EEC-A780-B73559B9F24C}"/>
-              </a:ext>
-              <a:ext uri="{C183D7F6-B498-43B3-948B-1728B52AA6E4}">
-                <adec:decorative xmlns:adec="http://schemas.microsoft.com/office/drawing/2017/decorative" val="1"/>
-              </a:ext>
-            </a:extLst>
-          </p:cNvPr>
-          <p:cNvSpPr>
-            <a:spLocks noGrp="1" noRot="1" noChangeAspect="1" noMove="1" noResize="1" noEditPoints="1" noAdjustHandles="1" noChangeArrowheads="1" noChangeShapeType="1" noTextEdit="1"/>
-          </p:cNvSpPr>
-          <p:nvPr>
-            <p:extLst>
-              <p:ext uri="{386F3935-93C4-4BCD-93E2-E3B085C9AB24}">
-                <p16:designElem xmlns:p16="http://schemas.microsoft.com/office/powerpoint/2015/main" val="1"/>
-              </p:ext>
-            </p:extLst>
-          </p:nvPr>
-        </p:nvSpPr>
-        <p:spPr bwMode="auto">
-          <a:xfrm flipV="1">
-            <a:off x="-159" y="3179901"/>
-            <a:ext cx="1098194" cy="514066"/>
-          </a:xfrm>
-          <a:custGeom>
-            <a:avLst/>
-            <a:gdLst>
-              <a:gd name="connsiteX0" fmla="*/ 10000 w 10044"/>
-              <a:gd name="connsiteY0" fmla="*/ 4701 h 9966"/>
-              <a:gd name="connsiteX1" fmla="*/ 8559 w 10044"/>
-              <a:gd name="connsiteY1" fmla="*/ 188 h 9966"/>
-              <a:gd name="connsiteX2" fmla="*/ 8527 w 10044"/>
-              <a:gd name="connsiteY2" fmla="*/ 94 h 9966"/>
-              <a:gd name="connsiteX3" fmla="*/ 8438 w 10044"/>
-              <a:gd name="connsiteY3" fmla="*/ 0 h 9966"/>
-              <a:gd name="connsiteX4" fmla="*/ 7867 w 10044"/>
-              <a:gd name="connsiteY4" fmla="*/ 0 h 9966"/>
-              <a:gd name="connsiteX5" fmla="*/ 0 w 10044"/>
-              <a:gd name="connsiteY5" fmla="*/ 70 h 9966"/>
-              <a:gd name="connsiteX6" fmla="*/ 3132 w 10044"/>
-              <a:gd name="connsiteY6" fmla="*/ 9763 h 9966"/>
-              <a:gd name="connsiteX7" fmla="*/ 7867 w 10044"/>
-              <a:gd name="connsiteY7" fmla="*/ 9966 h 9966"/>
-              <a:gd name="connsiteX8" fmla="*/ 8438 w 10044"/>
-              <a:gd name="connsiteY8" fmla="*/ 9966 h 9966"/>
-              <a:gd name="connsiteX9" fmla="*/ 8527 w 10044"/>
-              <a:gd name="connsiteY9" fmla="*/ 9872 h 9966"/>
-              <a:gd name="connsiteX10" fmla="*/ 8559 w 10044"/>
-              <a:gd name="connsiteY10" fmla="*/ 9778 h 9966"/>
-              <a:gd name="connsiteX11" fmla="*/ 10000 w 10044"/>
-              <a:gd name="connsiteY11" fmla="*/ 5265 h 9966"/>
-              <a:gd name="connsiteX12" fmla="*/ 10000 w 10044"/>
-              <a:gd name="connsiteY12" fmla="*/ 4701 h 9966"/>
-              <a:gd name="connsiteX0" fmla="*/ 6839 w 6883"/>
-              <a:gd name="connsiteY0" fmla="*/ 4885 h 10168"/>
-              <a:gd name="connsiteX1" fmla="*/ 5405 w 6883"/>
-              <a:gd name="connsiteY1" fmla="*/ 357 h 10168"/>
-              <a:gd name="connsiteX2" fmla="*/ 5373 w 6883"/>
-              <a:gd name="connsiteY2" fmla="*/ 262 h 10168"/>
-              <a:gd name="connsiteX3" fmla="*/ 5284 w 6883"/>
-              <a:gd name="connsiteY3" fmla="*/ 168 h 10168"/>
-              <a:gd name="connsiteX4" fmla="*/ 4716 w 6883"/>
-              <a:gd name="connsiteY4" fmla="*/ 168 h 10168"/>
-              <a:gd name="connsiteX5" fmla="*/ 50 w 6883"/>
-              <a:gd name="connsiteY5" fmla="*/ 0 h 10168"/>
-              <a:gd name="connsiteX6" fmla="*/ 1 w 6883"/>
-              <a:gd name="connsiteY6" fmla="*/ 9964 h 10168"/>
-              <a:gd name="connsiteX7" fmla="*/ 4716 w 6883"/>
-              <a:gd name="connsiteY7" fmla="*/ 10168 h 10168"/>
-              <a:gd name="connsiteX8" fmla="*/ 5284 w 6883"/>
-              <a:gd name="connsiteY8" fmla="*/ 10168 h 10168"/>
-              <a:gd name="connsiteX9" fmla="*/ 5373 w 6883"/>
-              <a:gd name="connsiteY9" fmla="*/ 10074 h 10168"/>
-              <a:gd name="connsiteX10" fmla="*/ 5405 w 6883"/>
-              <a:gd name="connsiteY10" fmla="*/ 9979 h 10168"/>
-              <a:gd name="connsiteX11" fmla="*/ 6839 w 6883"/>
-              <a:gd name="connsiteY11" fmla="*/ 5451 h 10168"/>
-              <a:gd name="connsiteX12" fmla="*/ 6839 w 6883"/>
-              <a:gd name="connsiteY12" fmla="*/ 4885 h 10168"/>
-            </a:gdLst>
-            <a:ahLst/>
-            <a:cxnLst>
-              <a:cxn ang="0">
-                <a:pos x="connsiteX0" y="connsiteY0"/>
-              </a:cxn>
-              <a:cxn ang="0">
-                <a:pos x="connsiteX1" y="connsiteY1"/>
-              </a:cxn>
-              <a:cxn ang="0">
-                <a:pos x="connsiteX2" y="connsiteY2"/>
-              </a:cxn>
-              <a:cxn ang="0">
-                <a:pos x="connsiteX3" y="connsiteY3"/>
-              </a:cxn>
-              <a:cxn ang="0">
-                <a:pos x="connsiteX4" y="connsiteY4"/>
-              </a:cxn>
-              <a:cxn ang="0">
-                <a:pos x="connsiteX5" y="connsiteY5"/>
-              </a:cxn>
-              <a:cxn ang="0">
-                <a:pos x="connsiteX6" y="connsiteY6"/>
-              </a:cxn>
-              <a:cxn ang="0">
-                <a:pos x="connsiteX7" y="connsiteY7"/>
-              </a:cxn>
-              <a:cxn ang="0">
-                <a:pos x="connsiteX8" y="connsiteY8"/>
-              </a:cxn>
-              <a:cxn ang="0">
-                <a:pos x="connsiteX9" y="connsiteY9"/>
-              </a:cxn>
-              <a:cxn ang="0">
-                <a:pos x="connsiteX10" y="connsiteY10"/>
-              </a:cxn>
-              <a:cxn ang="0">
-                <a:pos x="connsiteX11" y="connsiteY11"/>
-              </a:cxn>
-              <a:cxn ang="0">
-                <a:pos x="connsiteX12" y="connsiteY12"/>
-              </a:cxn>
-            </a:cxnLst>
-            <a:rect l="l" t="t" r="r" b="b"/>
-            <a:pathLst>
-              <a:path w="6883" h="10168">
-                <a:moveTo>
-                  <a:pt x="6839" y="4885"/>
-                </a:moveTo>
-                <a:lnTo>
-                  <a:pt x="5405" y="357"/>
-                </a:lnTo>
-                <a:cubicBezTo>
-                  <a:pt x="5395" y="325"/>
-                  <a:pt x="5383" y="294"/>
-                  <a:pt x="5373" y="262"/>
-                </a:cubicBezTo>
-                <a:cubicBezTo>
-                  <a:pt x="5344" y="168"/>
-                  <a:pt x="5314" y="168"/>
-                  <a:pt x="5284" y="168"/>
-                </a:cubicBezTo>
-                <a:lnTo>
-                  <a:pt x="4716" y="168"/>
-                </a:lnTo>
-                <a:lnTo>
-                  <a:pt x="50" y="0"/>
-                </a:lnTo>
-                <a:cubicBezTo>
-                  <a:pt x="59" y="3322"/>
-                  <a:pt x="-8" y="6643"/>
-                  <a:pt x="1" y="9964"/>
-                </a:cubicBezTo>
-                <a:lnTo>
-                  <a:pt x="4716" y="10168"/>
-                </a:lnTo>
-                <a:lnTo>
-                  <a:pt x="5284" y="10168"/>
-                </a:lnTo>
-                <a:cubicBezTo>
-                  <a:pt x="5314" y="10168"/>
-                  <a:pt x="5344" y="10074"/>
-                  <a:pt x="5373" y="10074"/>
-                </a:cubicBezTo>
-                <a:cubicBezTo>
-                  <a:pt x="5373" y="9979"/>
-                  <a:pt x="5405" y="9979"/>
-                  <a:pt x="5405" y="9979"/>
-                </a:cubicBezTo>
-                <a:lnTo>
-                  <a:pt x="6839" y="5451"/>
-                </a:lnTo>
-                <a:cubicBezTo>
-                  <a:pt x="6898" y="5262"/>
-                  <a:pt x="6898" y="5074"/>
-                  <a:pt x="6839" y="4885"/>
-                </a:cubicBezTo>
-                <a:close/>
-              </a:path>
-            </a:pathLst>
-          </a:custGeom>
-          <a:solidFill>
-            <a:schemeClr val="accent1"/>
-          </a:solidFill>
-          <a:ln>
-            <a:noFill/>
-          </a:ln>
-        </p:spPr>
-        <p:txBody>
-          <a:bodyPr/>
-          <a:lstStyle/>
-          <a:p>
-            <a:endParaRPr lang="en-US"/>
-          </a:p>
-        </p:txBody>
-      </p:sp>
-      <p:sp useBgFill="1">
-        <p:nvSpPr>
-          <p:cNvPr id="14" name="Rectangle 13">
-            <a:extLst>
-              <a:ext uri="{FF2B5EF4-FFF2-40B4-BE49-F238E27FC236}">
-                <a16:creationId xmlns:a16="http://schemas.microsoft.com/office/drawing/2014/main" id="{2C6246ED-0535-4496-A8F6-1E80CC4EB853}"/>
-              </a:ext>
-              <a:ext uri="{C183D7F6-B498-43B3-948B-1728B52AA6E4}">
-                <adec:decorative xmlns:adec="http://schemas.microsoft.com/office/drawing/2017/decorative" val="1"/>
-              </a:ext>
-            </a:extLst>
-          </p:cNvPr>
-          <p:cNvSpPr>
-            <a:spLocks noGrp="1" noRot="1" noChangeAspect="1" noMove="1" noResize="1" noEditPoints="1" noAdjustHandles="1" noChangeArrowheads="1" noChangeShapeType="1" noTextEdit="1"/>
-          </p:cNvSpPr>
-          <p:nvPr>
-            <p:extLst>
-              <p:ext uri="{386F3935-93C4-4BCD-93E2-E3B085C9AB24}">
-                <p16:designElem xmlns:p16="http://schemas.microsoft.com/office/powerpoint/2015/main" val="1"/>
-              </p:ext>
-            </p:extLst>
-          </p:nvPr>
-        </p:nvSpPr>
-        <p:spPr>
-          <a:xfrm>
-            <a:off x="4795736" y="0"/>
-            <a:ext cx="7396264" cy="6858000"/>
-          </a:xfrm>
-          <a:prstGeom prst="rect">
-            <a:avLst/>
-          </a:prstGeom>
-          <a:ln>
-            <a:noFill/>
-          </a:ln>
-        </p:spPr>
-        <p:style>
-          <a:lnRef idx="2">
-            <a:schemeClr val="accent1">
-              <a:shade val="50000"/>
-            </a:schemeClr>
-          </a:lnRef>
-          <a:fillRef idx="1">
-            <a:schemeClr val="accent1"/>
-          </a:fillRef>
-          <a:effectRef idx="0">
-            <a:schemeClr val="accent1"/>
-          </a:effectRef>
-          <a:fontRef idx="minor">
-            <a:schemeClr val="lt1"/>
-          </a:fontRef>
-        </p:style>
-        <p:txBody>
-          <a:bodyPr rtlCol="0" anchor="ctr"/>
-          <a:lstStyle/>
-          <a:p>
-            <a:pPr algn="ctr"/>
-            <a:endParaRPr lang="en-US"/>
-          </a:p>
-        </p:txBody>
-      </p:sp>
-      <p:graphicFrame>
-        <p:nvGraphicFramePr>
-          <p:cNvPr id="5" name="Content Placeholder 2">
-            <a:extLst>
-              <a:ext uri="{FF2B5EF4-FFF2-40B4-BE49-F238E27FC236}">
-                <a16:creationId xmlns:a16="http://schemas.microsoft.com/office/drawing/2014/main" id="{D08B24B8-C706-4EF0-9C06-35DD9F8C019D}"/>
-              </a:ext>
-            </a:extLst>
-          </p:cNvPr>
-          <p:cNvGraphicFramePr>
-            <a:graphicFrameLocks noGrp="1"/>
-          </p:cNvGraphicFramePr>
-          <p:nvPr>
-            <p:ph idx="1"/>
-            <p:extLst>
-              <p:ext uri="{D42A27DB-BD31-4B8C-83A1-F6EECF244321}">
-                <p14:modId xmlns:p14="http://schemas.microsoft.com/office/powerpoint/2010/main" val="2390931995"/>
-              </p:ext>
-            </p:extLst>
-          </p:nvPr>
-        </p:nvGraphicFramePr>
-        <p:xfrm>
-          <a:off x="4713144" y="641551"/>
-          <a:ext cx="6832212" cy="5264779"/>
-        </p:xfrm>
-        <a:graphic>
-          <a:graphicData uri="http://schemas.openxmlformats.org/drawingml/2006/diagram">
-            <dgm:relIds xmlns:dgm="http://schemas.openxmlformats.org/drawingml/2006/diagram" xmlns:r="http://schemas.openxmlformats.org/officeDocument/2006/relationships" r:dm="rId2" r:lo="rId3" r:qs="rId4" r:cs="rId5"/>
-          </a:graphicData>
-        </a:graphic>
-      </p:graphicFrame>
-    </p:spTree>
-    <p:extLst>
-      <p:ext uri="{BB962C8B-B14F-4D97-AF65-F5344CB8AC3E}">
-        <p14:creationId xmlns:p14="http://schemas.microsoft.com/office/powerpoint/2010/main" val="4053071767"/>
       </p:ext>
     </p:extLst>
   </p:cSld>
@@ -39023,6 +38283,902 @@
   </p:cSld>
   <p:clrMapOvr>
     <a:overrideClrMapping bg1="dk1" tx1="lt1" bg2="dk2" tx2="lt2" accent1="accent1" accent2="accent2" accent3="accent3" accent4="accent4" accent5="accent5" accent6="accent6" hlink="hlink" folHlink="folHlink"/>
+  </p:clrMapOvr>
+</p:sld>
+</file>
+
+<file path=ppt/slides/slide20.xml><?xml version="1.0" encoding="utf-8"?>
+<p:sld xmlns:a="http://schemas.openxmlformats.org/drawingml/2006/main" xmlns:r="http://schemas.openxmlformats.org/officeDocument/2006/relationships" xmlns:p="http://schemas.openxmlformats.org/presentationml/2006/main">
+  <p:cSld>
+    <p:bg>
+      <p:bgPr>
+        <a:gradFill rotWithShape="1">
+          <a:gsLst>
+            <a:gs pos="0">
+              <a:schemeClr val="bg2">
+                <a:tint val="90000"/>
+                <a:satMod val="92000"/>
+                <a:lumMod val="120000"/>
+              </a:schemeClr>
+            </a:gs>
+            <a:gs pos="100000">
+              <a:schemeClr val="bg2">
+                <a:shade val="98000"/>
+                <a:satMod val="120000"/>
+                <a:lumMod val="98000"/>
+              </a:schemeClr>
+            </a:gs>
+          </a:gsLst>
+          <a:path path="circle">
+            <a:fillToRect l="50000" t="50000" r="100000" b="100000"/>
+          </a:path>
+        </a:gradFill>
+        <a:effectLst/>
+      </p:bgPr>
+    </p:bg>
+    <p:spTree>
+      <p:nvGrpSpPr>
+        <p:cNvPr id="1" name=""/>
+        <p:cNvGrpSpPr/>
+        <p:nvPr/>
+      </p:nvGrpSpPr>
+      <p:grpSpPr>
+        <a:xfrm>
+          <a:off x="0" y="0"/>
+          <a:ext cx="0" cy="0"/>
+          <a:chOff x="0" y="0"/>
+          <a:chExt cx="0" cy="0"/>
+        </a:xfrm>
+      </p:grpSpPr>
+      <p:sp>
+        <p:nvSpPr>
+          <p:cNvPr id="10" name="Rectangle 9">
+            <a:extLst>
+              <a:ext uri="{FF2B5EF4-FFF2-40B4-BE49-F238E27FC236}">
+                <a16:creationId xmlns:a16="http://schemas.microsoft.com/office/drawing/2014/main" id="{A3D9AEEE-1CCD-43C0-BA3E-16D60A6E23C0}"/>
+              </a:ext>
+              <a:ext uri="{C183D7F6-B498-43B3-948B-1728B52AA6E4}">
+                <adec:decorative xmlns:adec="http://schemas.microsoft.com/office/drawing/2017/decorative" val="1"/>
+              </a:ext>
+            </a:extLst>
+          </p:cNvPr>
+          <p:cNvSpPr>
+            <a:spLocks noGrp="1" noRot="1" noChangeAspect="1" noMove="1" noResize="1" noEditPoints="1" noAdjustHandles="1" noChangeArrowheads="1" noChangeShapeType="1" noTextEdit="1"/>
+          </p:cNvSpPr>
+          <p:nvPr>
+            <p:extLst>
+              <p:ext uri="{386F3935-93C4-4BCD-93E2-E3B085C9AB24}">
+                <p16:designElem xmlns:p16="http://schemas.microsoft.com/office/powerpoint/2015/main" val="1"/>
+              </p:ext>
+            </p:extLst>
+          </p:nvPr>
+        </p:nvSpPr>
+        <p:spPr>
+          <a:xfrm>
+            <a:off x="1" y="0"/>
+            <a:ext cx="4059079" cy="6858000"/>
+          </a:xfrm>
+          <a:prstGeom prst="rect">
+            <a:avLst/>
+          </a:prstGeom>
+          <a:solidFill>
+            <a:schemeClr val="tx2"/>
+          </a:solidFill>
+          <a:ln>
+            <a:noFill/>
+          </a:ln>
+        </p:spPr>
+        <p:style>
+          <a:lnRef idx="2">
+            <a:schemeClr val="accent1">
+              <a:shade val="50000"/>
+            </a:schemeClr>
+          </a:lnRef>
+          <a:fillRef idx="1">
+            <a:schemeClr val="accent1"/>
+          </a:fillRef>
+          <a:effectRef idx="0">
+            <a:schemeClr val="accent1"/>
+          </a:effectRef>
+          <a:fontRef idx="minor">
+            <a:schemeClr val="lt1"/>
+          </a:fontRef>
+        </p:style>
+        <p:txBody>
+          <a:bodyPr rtlCol="0" anchor="ctr"/>
+          <a:lstStyle/>
+          <a:p>
+            <a:pPr algn="ctr"/>
+            <a:endParaRPr lang="en-US"/>
+          </a:p>
+        </p:txBody>
+      </p:sp>
+      <p:sp>
+        <p:nvSpPr>
+          <p:cNvPr id="2" name="Title 1">
+            <a:extLst>
+              <a:ext uri="{FF2B5EF4-FFF2-40B4-BE49-F238E27FC236}">
+                <a16:creationId xmlns:a16="http://schemas.microsoft.com/office/drawing/2014/main" id="{B6FCBFED-801E-4AEB-9456-FAF14E81A7C2}"/>
+              </a:ext>
+            </a:extLst>
+          </p:cNvPr>
+          <p:cNvSpPr>
+            <a:spLocks noGrp="1"/>
+          </p:cNvSpPr>
+          <p:nvPr>
+            <p:ph type="title"/>
+          </p:nvPr>
+        </p:nvSpPr>
+        <p:spPr>
+          <a:xfrm>
+            <a:off x="1259893" y="3101093"/>
+            <a:ext cx="2454052" cy="3029344"/>
+          </a:xfrm>
+        </p:spPr>
+        <p:txBody>
+          <a:bodyPr>
+            <a:normAutofit/>
+          </a:bodyPr>
+          <a:lstStyle/>
+          <a:p>
+            <a:r>
+              <a:rPr lang="en-US" sz="3000">
+                <a:solidFill>
+                  <a:schemeClr val="bg1"/>
+                </a:solidFill>
+              </a:rPr>
+              <a:t>Data Consistency</a:t>
+            </a:r>
+          </a:p>
+        </p:txBody>
+      </p:sp>
+      <p:sp>
+        <p:nvSpPr>
+          <p:cNvPr id="12" name="Freeform 11">
+            <a:extLst>
+              <a:ext uri="{FF2B5EF4-FFF2-40B4-BE49-F238E27FC236}">
+                <a16:creationId xmlns:a16="http://schemas.microsoft.com/office/drawing/2014/main" id="{60F880A6-33D3-4EEC-A780-B73559B9F24C}"/>
+              </a:ext>
+              <a:ext uri="{C183D7F6-B498-43B3-948B-1728B52AA6E4}">
+                <adec:decorative xmlns:adec="http://schemas.microsoft.com/office/drawing/2017/decorative" val="1"/>
+              </a:ext>
+            </a:extLst>
+          </p:cNvPr>
+          <p:cNvSpPr>
+            <a:spLocks noGrp="1" noRot="1" noChangeAspect="1" noMove="1" noResize="1" noEditPoints="1" noAdjustHandles="1" noChangeArrowheads="1" noChangeShapeType="1" noTextEdit="1"/>
+          </p:cNvSpPr>
+          <p:nvPr>
+            <p:extLst>
+              <p:ext uri="{386F3935-93C4-4BCD-93E2-E3B085C9AB24}">
+                <p16:designElem xmlns:p16="http://schemas.microsoft.com/office/powerpoint/2015/main" val="1"/>
+              </p:ext>
+            </p:extLst>
+          </p:nvPr>
+        </p:nvSpPr>
+        <p:spPr bwMode="auto">
+          <a:xfrm flipV="1">
+            <a:off x="-159" y="3179901"/>
+            <a:ext cx="1098194" cy="514066"/>
+          </a:xfrm>
+          <a:custGeom>
+            <a:avLst/>
+            <a:gdLst>
+              <a:gd name="connsiteX0" fmla="*/ 10000 w 10044"/>
+              <a:gd name="connsiteY0" fmla="*/ 4701 h 9966"/>
+              <a:gd name="connsiteX1" fmla="*/ 8559 w 10044"/>
+              <a:gd name="connsiteY1" fmla="*/ 188 h 9966"/>
+              <a:gd name="connsiteX2" fmla="*/ 8527 w 10044"/>
+              <a:gd name="connsiteY2" fmla="*/ 94 h 9966"/>
+              <a:gd name="connsiteX3" fmla="*/ 8438 w 10044"/>
+              <a:gd name="connsiteY3" fmla="*/ 0 h 9966"/>
+              <a:gd name="connsiteX4" fmla="*/ 7867 w 10044"/>
+              <a:gd name="connsiteY4" fmla="*/ 0 h 9966"/>
+              <a:gd name="connsiteX5" fmla="*/ 0 w 10044"/>
+              <a:gd name="connsiteY5" fmla="*/ 70 h 9966"/>
+              <a:gd name="connsiteX6" fmla="*/ 3132 w 10044"/>
+              <a:gd name="connsiteY6" fmla="*/ 9763 h 9966"/>
+              <a:gd name="connsiteX7" fmla="*/ 7867 w 10044"/>
+              <a:gd name="connsiteY7" fmla="*/ 9966 h 9966"/>
+              <a:gd name="connsiteX8" fmla="*/ 8438 w 10044"/>
+              <a:gd name="connsiteY8" fmla="*/ 9966 h 9966"/>
+              <a:gd name="connsiteX9" fmla="*/ 8527 w 10044"/>
+              <a:gd name="connsiteY9" fmla="*/ 9872 h 9966"/>
+              <a:gd name="connsiteX10" fmla="*/ 8559 w 10044"/>
+              <a:gd name="connsiteY10" fmla="*/ 9778 h 9966"/>
+              <a:gd name="connsiteX11" fmla="*/ 10000 w 10044"/>
+              <a:gd name="connsiteY11" fmla="*/ 5265 h 9966"/>
+              <a:gd name="connsiteX12" fmla="*/ 10000 w 10044"/>
+              <a:gd name="connsiteY12" fmla="*/ 4701 h 9966"/>
+              <a:gd name="connsiteX0" fmla="*/ 6839 w 6883"/>
+              <a:gd name="connsiteY0" fmla="*/ 4885 h 10168"/>
+              <a:gd name="connsiteX1" fmla="*/ 5405 w 6883"/>
+              <a:gd name="connsiteY1" fmla="*/ 357 h 10168"/>
+              <a:gd name="connsiteX2" fmla="*/ 5373 w 6883"/>
+              <a:gd name="connsiteY2" fmla="*/ 262 h 10168"/>
+              <a:gd name="connsiteX3" fmla="*/ 5284 w 6883"/>
+              <a:gd name="connsiteY3" fmla="*/ 168 h 10168"/>
+              <a:gd name="connsiteX4" fmla="*/ 4716 w 6883"/>
+              <a:gd name="connsiteY4" fmla="*/ 168 h 10168"/>
+              <a:gd name="connsiteX5" fmla="*/ 50 w 6883"/>
+              <a:gd name="connsiteY5" fmla="*/ 0 h 10168"/>
+              <a:gd name="connsiteX6" fmla="*/ 1 w 6883"/>
+              <a:gd name="connsiteY6" fmla="*/ 9964 h 10168"/>
+              <a:gd name="connsiteX7" fmla="*/ 4716 w 6883"/>
+              <a:gd name="connsiteY7" fmla="*/ 10168 h 10168"/>
+              <a:gd name="connsiteX8" fmla="*/ 5284 w 6883"/>
+              <a:gd name="connsiteY8" fmla="*/ 10168 h 10168"/>
+              <a:gd name="connsiteX9" fmla="*/ 5373 w 6883"/>
+              <a:gd name="connsiteY9" fmla="*/ 10074 h 10168"/>
+              <a:gd name="connsiteX10" fmla="*/ 5405 w 6883"/>
+              <a:gd name="connsiteY10" fmla="*/ 9979 h 10168"/>
+              <a:gd name="connsiteX11" fmla="*/ 6839 w 6883"/>
+              <a:gd name="connsiteY11" fmla="*/ 5451 h 10168"/>
+              <a:gd name="connsiteX12" fmla="*/ 6839 w 6883"/>
+              <a:gd name="connsiteY12" fmla="*/ 4885 h 10168"/>
+            </a:gdLst>
+            <a:ahLst/>
+            <a:cxnLst>
+              <a:cxn ang="0">
+                <a:pos x="connsiteX0" y="connsiteY0"/>
+              </a:cxn>
+              <a:cxn ang="0">
+                <a:pos x="connsiteX1" y="connsiteY1"/>
+              </a:cxn>
+              <a:cxn ang="0">
+                <a:pos x="connsiteX2" y="connsiteY2"/>
+              </a:cxn>
+              <a:cxn ang="0">
+                <a:pos x="connsiteX3" y="connsiteY3"/>
+              </a:cxn>
+              <a:cxn ang="0">
+                <a:pos x="connsiteX4" y="connsiteY4"/>
+              </a:cxn>
+              <a:cxn ang="0">
+                <a:pos x="connsiteX5" y="connsiteY5"/>
+              </a:cxn>
+              <a:cxn ang="0">
+                <a:pos x="connsiteX6" y="connsiteY6"/>
+              </a:cxn>
+              <a:cxn ang="0">
+                <a:pos x="connsiteX7" y="connsiteY7"/>
+              </a:cxn>
+              <a:cxn ang="0">
+                <a:pos x="connsiteX8" y="connsiteY8"/>
+              </a:cxn>
+              <a:cxn ang="0">
+                <a:pos x="connsiteX9" y="connsiteY9"/>
+              </a:cxn>
+              <a:cxn ang="0">
+                <a:pos x="connsiteX10" y="connsiteY10"/>
+              </a:cxn>
+              <a:cxn ang="0">
+                <a:pos x="connsiteX11" y="connsiteY11"/>
+              </a:cxn>
+              <a:cxn ang="0">
+                <a:pos x="connsiteX12" y="connsiteY12"/>
+              </a:cxn>
+            </a:cxnLst>
+            <a:rect l="l" t="t" r="r" b="b"/>
+            <a:pathLst>
+              <a:path w="6883" h="10168">
+                <a:moveTo>
+                  <a:pt x="6839" y="4885"/>
+                </a:moveTo>
+                <a:lnTo>
+                  <a:pt x="5405" y="357"/>
+                </a:lnTo>
+                <a:cubicBezTo>
+                  <a:pt x="5395" y="325"/>
+                  <a:pt x="5383" y="294"/>
+                  <a:pt x="5373" y="262"/>
+                </a:cubicBezTo>
+                <a:cubicBezTo>
+                  <a:pt x="5344" y="168"/>
+                  <a:pt x="5314" y="168"/>
+                  <a:pt x="5284" y="168"/>
+                </a:cubicBezTo>
+                <a:lnTo>
+                  <a:pt x="4716" y="168"/>
+                </a:lnTo>
+                <a:lnTo>
+                  <a:pt x="50" y="0"/>
+                </a:lnTo>
+                <a:cubicBezTo>
+                  <a:pt x="59" y="3322"/>
+                  <a:pt x="-8" y="6643"/>
+                  <a:pt x="1" y="9964"/>
+                </a:cubicBezTo>
+                <a:lnTo>
+                  <a:pt x="4716" y="10168"/>
+                </a:lnTo>
+                <a:lnTo>
+                  <a:pt x="5284" y="10168"/>
+                </a:lnTo>
+                <a:cubicBezTo>
+                  <a:pt x="5314" y="10168"/>
+                  <a:pt x="5344" y="10074"/>
+                  <a:pt x="5373" y="10074"/>
+                </a:cubicBezTo>
+                <a:cubicBezTo>
+                  <a:pt x="5373" y="9979"/>
+                  <a:pt x="5405" y="9979"/>
+                  <a:pt x="5405" y="9979"/>
+                </a:cubicBezTo>
+                <a:lnTo>
+                  <a:pt x="6839" y="5451"/>
+                </a:lnTo>
+                <a:cubicBezTo>
+                  <a:pt x="6898" y="5262"/>
+                  <a:pt x="6898" y="5074"/>
+                  <a:pt x="6839" y="4885"/>
+                </a:cubicBezTo>
+                <a:close/>
+              </a:path>
+            </a:pathLst>
+          </a:custGeom>
+          <a:solidFill>
+            <a:schemeClr val="accent1"/>
+          </a:solidFill>
+          <a:ln>
+            <a:noFill/>
+          </a:ln>
+        </p:spPr>
+        <p:txBody>
+          <a:bodyPr/>
+          <a:lstStyle/>
+          <a:p>
+            <a:endParaRPr lang="en-US"/>
+          </a:p>
+        </p:txBody>
+      </p:sp>
+      <p:sp useBgFill="1">
+        <p:nvSpPr>
+          <p:cNvPr id="14" name="Rectangle 13">
+            <a:extLst>
+              <a:ext uri="{FF2B5EF4-FFF2-40B4-BE49-F238E27FC236}">
+                <a16:creationId xmlns:a16="http://schemas.microsoft.com/office/drawing/2014/main" id="{2C6246ED-0535-4496-A8F6-1E80CC4EB853}"/>
+              </a:ext>
+              <a:ext uri="{C183D7F6-B498-43B3-948B-1728B52AA6E4}">
+                <adec:decorative xmlns:adec="http://schemas.microsoft.com/office/drawing/2017/decorative" val="1"/>
+              </a:ext>
+            </a:extLst>
+          </p:cNvPr>
+          <p:cNvSpPr>
+            <a:spLocks noGrp="1" noRot="1" noChangeAspect="1" noMove="1" noResize="1" noEditPoints="1" noAdjustHandles="1" noChangeArrowheads="1" noChangeShapeType="1" noTextEdit="1"/>
+          </p:cNvSpPr>
+          <p:nvPr>
+            <p:extLst>
+              <p:ext uri="{386F3935-93C4-4BCD-93E2-E3B085C9AB24}">
+                <p16:designElem xmlns:p16="http://schemas.microsoft.com/office/powerpoint/2015/main" val="1"/>
+              </p:ext>
+            </p:extLst>
+          </p:nvPr>
+        </p:nvSpPr>
+        <p:spPr>
+          <a:xfrm>
+            <a:off x="4795736" y="0"/>
+            <a:ext cx="7396264" cy="6858000"/>
+          </a:xfrm>
+          <a:prstGeom prst="rect">
+            <a:avLst/>
+          </a:prstGeom>
+          <a:ln>
+            <a:noFill/>
+          </a:ln>
+        </p:spPr>
+        <p:style>
+          <a:lnRef idx="2">
+            <a:schemeClr val="accent1">
+              <a:shade val="50000"/>
+            </a:schemeClr>
+          </a:lnRef>
+          <a:fillRef idx="1">
+            <a:schemeClr val="accent1"/>
+          </a:fillRef>
+          <a:effectRef idx="0">
+            <a:schemeClr val="accent1"/>
+          </a:effectRef>
+          <a:fontRef idx="minor">
+            <a:schemeClr val="lt1"/>
+          </a:fontRef>
+        </p:style>
+        <p:txBody>
+          <a:bodyPr rtlCol="0" anchor="ctr"/>
+          <a:lstStyle/>
+          <a:p>
+            <a:pPr algn="ctr"/>
+            <a:endParaRPr lang="en-US"/>
+          </a:p>
+        </p:txBody>
+      </p:sp>
+      <p:graphicFrame>
+        <p:nvGraphicFramePr>
+          <p:cNvPr id="5" name="Content Placeholder 2">
+            <a:extLst>
+              <a:ext uri="{FF2B5EF4-FFF2-40B4-BE49-F238E27FC236}">
+                <a16:creationId xmlns:a16="http://schemas.microsoft.com/office/drawing/2014/main" id="{72980326-5E19-4FB4-9720-2E3D33DC5B35}"/>
+              </a:ext>
+            </a:extLst>
+          </p:cNvPr>
+          <p:cNvGraphicFramePr>
+            <a:graphicFrameLocks noGrp="1"/>
+          </p:cNvGraphicFramePr>
+          <p:nvPr>
+            <p:ph idx="1"/>
+            <p:extLst>
+              <p:ext uri="{D42A27DB-BD31-4B8C-83A1-F6EECF244321}">
+                <p14:modId xmlns:p14="http://schemas.microsoft.com/office/powerpoint/2010/main" val="548616360"/>
+              </p:ext>
+            </p:extLst>
+          </p:nvPr>
+        </p:nvGraphicFramePr>
+        <p:xfrm>
+          <a:off x="4713144" y="641551"/>
+          <a:ext cx="6832212" cy="5264779"/>
+        </p:xfrm>
+        <a:graphic>
+          <a:graphicData uri="http://schemas.openxmlformats.org/drawingml/2006/diagram">
+            <dgm:relIds xmlns:dgm="http://schemas.openxmlformats.org/drawingml/2006/diagram" xmlns:r="http://schemas.openxmlformats.org/officeDocument/2006/relationships" r:dm="rId2" r:lo="rId3" r:qs="rId4" r:cs="rId5"/>
+          </a:graphicData>
+        </a:graphic>
+      </p:graphicFrame>
+    </p:spTree>
+    <p:extLst>
+      <p:ext uri="{BB962C8B-B14F-4D97-AF65-F5344CB8AC3E}">
+        <p14:creationId xmlns:p14="http://schemas.microsoft.com/office/powerpoint/2010/main" val="599986821"/>
+      </p:ext>
+    </p:extLst>
+  </p:cSld>
+  <p:clrMapOvr>
+    <a:masterClrMapping/>
+  </p:clrMapOvr>
+</p:sld>
+</file>
+
+<file path=ppt/slides/slide21.xml><?xml version="1.0" encoding="utf-8"?>
+<p:sld xmlns:a="http://schemas.openxmlformats.org/drawingml/2006/main" xmlns:r="http://schemas.openxmlformats.org/officeDocument/2006/relationships" xmlns:p="http://schemas.openxmlformats.org/presentationml/2006/main">
+  <p:cSld>
+    <p:bg>
+      <p:bgPr>
+        <a:gradFill rotWithShape="1">
+          <a:gsLst>
+            <a:gs pos="0">
+              <a:schemeClr val="bg2">
+                <a:tint val="90000"/>
+                <a:satMod val="92000"/>
+                <a:lumMod val="120000"/>
+              </a:schemeClr>
+            </a:gs>
+            <a:gs pos="100000">
+              <a:schemeClr val="bg2">
+                <a:shade val="98000"/>
+                <a:satMod val="120000"/>
+                <a:lumMod val="98000"/>
+              </a:schemeClr>
+            </a:gs>
+          </a:gsLst>
+          <a:path path="circle">
+            <a:fillToRect l="50000" t="50000" r="100000" b="100000"/>
+          </a:path>
+        </a:gradFill>
+        <a:effectLst/>
+      </p:bgPr>
+    </p:bg>
+    <p:spTree>
+      <p:nvGrpSpPr>
+        <p:cNvPr id="1" name=""/>
+        <p:cNvGrpSpPr/>
+        <p:nvPr/>
+      </p:nvGrpSpPr>
+      <p:grpSpPr>
+        <a:xfrm>
+          <a:off x="0" y="0"/>
+          <a:ext cx="0" cy="0"/>
+          <a:chOff x="0" y="0"/>
+          <a:chExt cx="0" cy="0"/>
+        </a:xfrm>
+      </p:grpSpPr>
+      <p:sp>
+        <p:nvSpPr>
+          <p:cNvPr id="10" name="Rectangle 9">
+            <a:extLst>
+              <a:ext uri="{FF2B5EF4-FFF2-40B4-BE49-F238E27FC236}">
+                <a16:creationId xmlns:a16="http://schemas.microsoft.com/office/drawing/2014/main" id="{A3D9AEEE-1CCD-43C0-BA3E-16D60A6E23C0}"/>
+              </a:ext>
+              <a:ext uri="{C183D7F6-B498-43B3-948B-1728B52AA6E4}">
+                <adec:decorative xmlns:adec="http://schemas.microsoft.com/office/drawing/2017/decorative" val="1"/>
+              </a:ext>
+            </a:extLst>
+          </p:cNvPr>
+          <p:cNvSpPr>
+            <a:spLocks noGrp="1" noRot="1" noChangeAspect="1" noMove="1" noResize="1" noEditPoints="1" noAdjustHandles="1" noChangeArrowheads="1" noChangeShapeType="1" noTextEdit="1"/>
+          </p:cNvSpPr>
+          <p:nvPr>
+            <p:extLst>
+              <p:ext uri="{386F3935-93C4-4BCD-93E2-E3B085C9AB24}">
+                <p16:designElem xmlns:p16="http://schemas.microsoft.com/office/powerpoint/2015/main" val="1"/>
+              </p:ext>
+            </p:extLst>
+          </p:nvPr>
+        </p:nvSpPr>
+        <p:spPr>
+          <a:xfrm>
+            <a:off x="1" y="0"/>
+            <a:ext cx="4059079" cy="6858000"/>
+          </a:xfrm>
+          <a:prstGeom prst="rect">
+            <a:avLst/>
+          </a:prstGeom>
+          <a:solidFill>
+            <a:schemeClr val="tx2"/>
+          </a:solidFill>
+          <a:ln>
+            <a:noFill/>
+          </a:ln>
+        </p:spPr>
+        <p:style>
+          <a:lnRef idx="2">
+            <a:schemeClr val="accent1">
+              <a:shade val="50000"/>
+            </a:schemeClr>
+          </a:lnRef>
+          <a:fillRef idx="1">
+            <a:schemeClr val="accent1"/>
+          </a:fillRef>
+          <a:effectRef idx="0">
+            <a:schemeClr val="accent1"/>
+          </a:effectRef>
+          <a:fontRef idx="minor">
+            <a:schemeClr val="lt1"/>
+          </a:fontRef>
+        </p:style>
+        <p:txBody>
+          <a:bodyPr rtlCol="0" anchor="ctr"/>
+          <a:lstStyle/>
+          <a:p>
+            <a:pPr algn="ctr"/>
+            <a:endParaRPr lang="en-US"/>
+          </a:p>
+        </p:txBody>
+      </p:sp>
+      <p:sp>
+        <p:nvSpPr>
+          <p:cNvPr id="2" name="Title 1">
+            <a:extLst>
+              <a:ext uri="{FF2B5EF4-FFF2-40B4-BE49-F238E27FC236}">
+                <a16:creationId xmlns:a16="http://schemas.microsoft.com/office/drawing/2014/main" id="{FF56FC2A-20F4-4F0D-A8C8-0491168DC201}"/>
+              </a:ext>
+            </a:extLst>
+          </p:cNvPr>
+          <p:cNvSpPr>
+            <a:spLocks noGrp="1"/>
+          </p:cNvSpPr>
+          <p:nvPr>
+            <p:ph type="title"/>
+          </p:nvPr>
+        </p:nvSpPr>
+        <p:spPr>
+          <a:xfrm>
+            <a:off x="1259893" y="3101093"/>
+            <a:ext cx="2454052" cy="3029344"/>
+          </a:xfrm>
+        </p:spPr>
+        <p:txBody>
+          <a:bodyPr>
+            <a:normAutofit/>
+          </a:bodyPr>
+          <a:lstStyle/>
+          <a:p>
+            <a:r>
+              <a:rPr lang="en-US" sz="3200">
+                <a:solidFill>
+                  <a:schemeClr val="bg1"/>
+                </a:solidFill>
+              </a:rPr>
+              <a:t>Operation</a:t>
+            </a:r>
+          </a:p>
+        </p:txBody>
+      </p:sp>
+      <p:sp>
+        <p:nvSpPr>
+          <p:cNvPr id="12" name="Freeform 11">
+            <a:extLst>
+              <a:ext uri="{FF2B5EF4-FFF2-40B4-BE49-F238E27FC236}">
+                <a16:creationId xmlns:a16="http://schemas.microsoft.com/office/drawing/2014/main" id="{60F880A6-33D3-4EEC-A780-B73559B9F24C}"/>
+              </a:ext>
+              <a:ext uri="{C183D7F6-B498-43B3-948B-1728B52AA6E4}">
+                <adec:decorative xmlns:adec="http://schemas.microsoft.com/office/drawing/2017/decorative" val="1"/>
+              </a:ext>
+            </a:extLst>
+          </p:cNvPr>
+          <p:cNvSpPr>
+            <a:spLocks noGrp="1" noRot="1" noChangeAspect="1" noMove="1" noResize="1" noEditPoints="1" noAdjustHandles="1" noChangeArrowheads="1" noChangeShapeType="1" noTextEdit="1"/>
+          </p:cNvSpPr>
+          <p:nvPr>
+            <p:extLst>
+              <p:ext uri="{386F3935-93C4-4BCD-93E2-E3B085C9AB24}">
+                <p16:designElem xmlns:p16="http://schemas.microsoft.com/office/powerpoint/2015/main" val="1"/>
+              </p:ext>
+            </p:extLst>
+          </p:nvPr>
+        </p:nvSpPr>
+        <p:spPr bwMode="auto">
+          <a:xfrm flipV="1">
+            <a:off x="-159" y="3179901"/>
+            <a:ext cx="1098194" cy="514066"/>
+          </a:xfrm>
+          <a:custGeom>
+            <a:avLst/>
+            <a:gdLst>
+              <a:gd name="connsiteX0" fmla="*/ 10000 w 10044"/>
+              <a:gd name="connsiteY0" fmla="*/ 4701 h 9966"/>
+              <a:gd name="connsiteX1" fmla="*/ 8559 w 10044"/>
+              <a:gd name="connsiteY1" fmla="*/ 188 h 9966"/>
+              <a:gd name="connsiteX2" fmla="*/ 8527 w 10044"/>
+              <a:gd name="connsiteY2" fmla="*/ 94 h 9966"/>
+              <a:gd name="connsiteX3" fmla="*/ 8438 w 10044"/>
+              <a:gd name="connsiteY3" fmla="*/ 0 h 9966"/>
+              <a:gd name="connsiteX4" fmla="*/ 7867 w 10044"/>
+              <a:gd name="connsiteY4" fmla="*/ 0 h 9966"/>
+              <a:gd name="connsiteX5" fmla="*/ 0 w 10044"/>
+              <a:gd name="connsiteY5" fmla="*/ 70 h 9966"/>
+              <a:gd name="connsiteX6" fmla="*/ 3132 w 10044"/>
+              <a:gd name="connsiteY6" fmla="*/ 9763 h 9966"/>
+              <a:gd name="connsiteX7" fmla="*/ 7867 w 10044"/>
+              <a:gd name="connsiteY7" fmla="*/ 9966 h 9966"/>
+              <a:gd name="connsiteX8" fmla="*/ 8438 w 10044"/>
+              <a:gd name="connsiteY8" fmla="*/ 9966 h 9966"/>
+              <a:gd name="connsiteX9" fmla="*/ 8527 w 10044"/>
+              <a:gd name="connsiteY9" fmla="*/ 9872 h 9966"/>
+              <a:gd name="connsiteX10" fmla="*/ 8559 w 10044"/>
+              <a:gd name="connsiteY10" fmla="*/ 9778 h 9966"/>
+              <a:gd name="connsiteX11" fmla="*/ 10000 w 10044"/>
+              <a:gd name="connsiteY11" fmla="*/ 5265 h 9966"/>
+              <a:gd name="connsiteX12" fmla="*/ 10000 w 10044"/>
+              <a:gd name="connsiteY12" fmla="*/ 4701 h 9966"/>
+              <a:gd name="connsiteX0" fmla="*/ 6839 w 6883"/>
+              <a:gd name="connsiteY0" fmla="*/ 4885 h 10168"/>
+              <a:gd name="connsiteX1" fmla="*/ 5405 w 6883"/>
+              <a:gd name="connsiteY1" fmla="*/ 357 h 10168"/>
+              <a:gd name="connsiteX2" fmla="*/ 5373 w 6883"/>
+              <a:gd name="connsiteY2" fmla="*/ 262 h 10168"/>
+              <a:gd name="connsiteX3" fmla="*/ 5284 w 6883"/>
+              <a:gd name="connsiteY3" fmla="*/ 168 h 10168"/>
+              <a:gd name="connsiteX4" fmla="*/ 4716 w 6883"/>
+              <a:gd name="connsiteY4" fmla="*/ 168 h 10168"/>
+              <a:gd name="connsiteX5" fmla="*/ 50 w 6883"/>
+              <a:gd name="connsiteY5" fmla="*/ 0 h 10168"/>
+              <a:gd name="connsiteX6" fmla="*/ 1 w 6883"/>
+              <a:gd name="connsiteY6" fmla="*/ 9964 h 10168"/>
+              <a:gd name="connsiteX7" fmla="*/ 4716 w 6883"/>
+              <a:gd name="connsiteY7" fmla="*/ 10168 h 10168"/>
+              <a:gd name="connsiteX8" fmla="*/ 5284 w 6883"/>
+              <a:gd name="connsiteY8" fmla="*/ 10168 h 10168"/>
+              <a:gd name="connsiteX9" fmla="*/ 5373 w 6883"/>
+              <a:gd name="connsiteY9" fmla="*/ 10074 h 10168"/>
+              <a:gd name="connsiteX10" fmla="*/ 5405 w 6883"/>
+              <a:gd name="connsiteY10" fmla="*/ 9979 h 10168"/>
+              <a:gd name="connsiteX11" fmla="*/ 6839 w 6883"/>
+              <a:gd name="connsiteY11" fmla="*/ 5451 h 10168"/>
+              <a:gd name="connsiteX12" fmla="*/ 6839 w 6883"/>
+              <a:gd name="connsiteY12" fmla="*/ 4885 h 10168"/>
+            </a:gdLst>
+            <a:ahLst/>
+            <a:cxnLst>
+              <a:cxn ang="0">
+                <a:pos x="connsiteX0" y="connsiteY0"/>
+              </a:cxn>
+              <a:cxn ang="0">
+                <a:pos x="connsiteX1" y="connsiteY1"/>
+              </a:cxn>
+              <a:cxn ang="0">
+                <a:pos x="connsiteX2" y="connsiteY2"/>
+              </a:cxn>
+              <a:cxn ang="0">
+                <a:pos x="connsiteX3" y="connsiteY3"/>
+              </a:cxn>
+              <a:cxn ang="0">
+                <a:pos x="connsiteX4" y="connsiteY4"/>
+              </a:cxn>
+              <a:cxn ang="0">
+                <a:pos x="connsiteX5" y="connsiteY5"/>
+              </a:cxn>
+              <a:cxn ang="0">
+                <a:pos x="connsiteX6" y="connsiteY6"/>
+              </a:cxn>
+              <a:cxn ang="0">
+                <a:pos x="connsiteX7" y="connsiteY7"/>
+              </a:cxn>
+              <a:cxn ang="0">
+                <a:pos x="connsiteX8" y="connsiteY8"/>
+              </a:cxn>
+              <a:cxn ang="0">
+                <a:pos x="connsiteX9" y="connsiteY9"/>
+              </a:cxn>
+              <a:cxn ang="0">
+                <a:pos x="connsiteX10" y="connsiteY10"/>
+              </a:cxn>
+              <a:cxn ang="0">
+                <a:pos x="connsiteX11" y="connsiteY11"/>
+              </a:cxn>
+              <a:cxn ang="0">
+                <a:pos x="connsiteX12" y="connsiteY12"/>
+              </a:cxn>
+            </a:cxnLst>
+            <a:rect l="l" t="t" r="r" b="b"/>
+            <a:pathLst>
+              <a:path w="6883" h="10168">
+                <a:moveTo>
+                  <a:pt x="6839" y="4885"/>
+                </a:moveTo>
+                <a:lnTo>
+                  <a:pt x="5405" y="357"/>
+                </a:lnTo>
+                <a:cubicBezTo>
+                  <a:pt x="5395" y="325"/>
+                  <a:pt x="5383" y="294"/>
+                  <a:pt x="5373" y="262"/>
+                </a:cubicBezTo>
+                <a:cubicBezTo>
+                  <a:pt x="5344" y="168"/>
+                  <a:pt x="5314" y="168"/>
+                  <a:pt x="5284" y="168"/>
+                </a:cubicBezTo>
+                <a:lnTo>
+                  <a:pt x="4716" y="168"/>
+                </a:lnTo>
+                <a:lnTo>
+                  <a:pt x="50" y="0"/>
+                </a:lnTo>
+                <a:cubicBezTo>
+                  <a:pt x="59" y="3322"/>
+                  <a:pt x="-8" y="6643"/>
+                  <a:pt x="1" y="9964"/>
+                </a:cubicBezTo>
+                <a:lnTo>
+                  <a:pt x="4716" y="10168"/>
+                </a:lnTo>
+                <a:lnTo>
+                  <a:pt x="5284" y="10168"/>
+                </a:lnTo>
+                <a:cubicBezTo>
+                  <a:pt x="5314" y="10168"/>
+                  <a:pt x="5344" y="10074"/>
+                  <a:pt x="5373" y="10074"/>
+                </a:cubicBezTo>
+                <a:cubicBezTo>
+                  <a:pt x="5373" y="9979"/>
+                  <a:pt x="5405" y="9979"/>
+                  <a:pt x="5405" y="9979"/>
+                </a:cubicBezTo>
+                <a:lnTo>
+                  <a:pt x="6839" y="5451"/>
+                </a:lnTo>
+                <a:cubicBezTo>
+                  <a:pt x="6898" y="5262"/>
+                  <a:pt x="6898" y="5074"/>
+                  <a:pt x="6839" y="4885"/>
+                </a:cubicBezTo>
+                <a:close/>
+              </a:path>
+            </a:pathLst>
+          </a:custGeom>
+          <a:solidFill>
+            <a:schemeClr val="accent1"/>
+          </a:solidFill>
+          <a:ln>
+            <a:noFill/>
+          </a:ln>
+        </p:spPr>
+        <p:txBody>
+          <a:bodyPr/>
+          <a:lstStyle/>
+          <a:p>
+            <a:endParaRPr lang="en-US"/>
+          </a:p>
+        </p:txBody>
+      </p:sp>
+      <p:sp useBgFill="1">
+        <p:nvSpPr>
+          <p:cNvPr id="14" name="Rectangle 13">
+            <a:extLst>
+              <a:ext uri="{FF2B5EF4-FFF2-40B4-BE49-F238E27FC236}">
+                <a16:creationId xmlns:a16="http://schemas.microsoft.com/office/drawing/2014/main" id="{2C6246ED-0535-4496-A8F6-1E80CC4EB853}"/>
+              </a:ext>
+              <a:ext uri="{C183D7F6-B498-43B3-948B-1728B52AA6E4}">
+                <adec:decorative xmlns:adec="http://schemas.microsoft.com/office/drawing/2017/decorative" val="1"/>
+              </a:ext>
+            </a:extLst>
+          </p:cNvPr>
+          <p:cNvSpPr>
+            <a:spLocks noGrp="1" noRot="1" noChangeAspect="1" noMove="1" noResize="1" noEditPoints="1" noAdjustHandles="1" noChangeArrowheads="1" noChangeShapeType="1" noTextEdit="1"/>
+          </p:cNvSpPr>
+          <p:nvPr>
+            <p:extLst>
+              <p:ext uri="{386F3935-93C4-4BCD-93E2-E3B085C9AB24}">
+                <p16:designElem xmlns:p16="http://schemas.microsoft.com/office/powerpoint/2015/main" val="1"/>
+              </p:ext>
+            </p:extLst>
+          </p:nvPr>
+        </p:nvSpPr>
+        <p:spPr>
+          <a:xfrm>
+            <a:off x="4795736" y="0"/>
+            <a:ext cx="7396264" cy="6858000"/>
+          </a:xfrm>
+          <a:prstGeom prst="rect">
+            <a:avLst/>
+          </a:prstGeom>
+          <a:ln>
+            <a:noFill/>
+          </a:ln>
+        </p:spPr>
+        <p:style>
+          <a:lnRef idx="2">
+            <a:schemeClr val="accent1">
+              <a:shade val="50000"/>
+            </a:schemeClr>
+          </a:lnRef>
+          <a:fillRef idx="1">
+            <a:schemeClr val="accent1"/>
+          </a:fillRef>
+          <a:effectRef idx="0">
+            <a:schemeClr val="accent1"/>
+          </a:effectRef>
+          <a:fontRef idx="minor">
+            <a:schemeClr val="lt1"/>
+          </a:fontRef>
+        </p:style>
+        <p:txBody>
+          <a:bodyPr rtlCol="0" anchor="ctr"/>
+          <a:lstStyle/>
+          <a:p>
+            <a:pPr algn="ctr"/>
+            <a:endParaRPr lang="en-US"/>
+          </a:p>
+        </p:txBody>
+      </p:sp>
+      <p:graphicFrame>
+        <p:nvGraphicFramePr>
+          <p:cNvPr id="5" name="Content Placeholder 2">
+            <a:extLst>
+              <a:ext uri="{FF2B5EF4-FFF2-40B4-BE49-F238E27FC236}">
+                <a16:creationId xmlns:a16="http://schemas.microsoft.com/office/drawing/2014/main" id="{D08B24B8-C706-4EF0-9C06-35DD9F8C019D}"/>
+              </a:ext>
+            </a:extLst>
+          </p:cNvPr>
+          <p:cNvGraphicFramePr>
+            <a:graphicFrameLocks noGrp="1"/>
+          </p:cNvGraphicFramePr>
+          <p:nvPr>
+            <p:ph idx="1"/>
+            <p:extLst>
+              <p:ext uri="{D42A27DB-BD31-4B8C-83A1-F6EECF244321}">
+                <p14:modId xmlns:p14="http://schemas.microsoft.com/office/powerpoint/2010/main" val="2390931995"/>
+              </p:ext>
+            </p:extLst>
+          </p:nvPr>
+        </p:nvGraphicFramePr>
+        <p:xfrm>
+          <a:off x="4713144" y="641551"/>
+          <a:ext cx="6832212" cy="5264779"/>
+        </p:xfrm>
+        <a:graphic>
+          <a:graphicData uri="http://schemas.openxmlformats.org/drawingml/2006/diagram">
+            <dgm:relIds xmlns:dgm="http://schemas.openxmlformats.org/drawingml/2006/diagram" xmlns:r="http://schemas.openxmlformats.org/officeDocument/2006/relationships" r:dm="rId2" r:lo="rId3" r:qs="rId4" r:cs="rId5"/>
+          </a:graphicData>
+        </a:graphic>
+      </p:graphicFrame>
+    </p:spTree>
+    <p:extLst>
+      <p:ext uri="{BB962C8B-B14F-4D97-AF65-F5344CB8AC3E}">
+        <p14:creationId xmlns:p14="http://schemas.microsoft.com/office/powerpoint/2010/main" val="4053071767"/>
+      </p:ext>
+    </p:extLst>
+  </p:cSld>
+  <p:clrMapOvr>
+    <a:masterClrMapping/>
   </p:clrMapOvr>
 </p:sld>
 </file>
@@ -40553,10 +40709,10 @@
       </p:grpSpPr>
       <p:pic>
         <p:nvPicPr>
-          <p:cNvPr id="6146" name="Picture 2">
+          <p:cNvPr id="1030" name="Picture 6" descr="No alternative text description for this image">
             <a:extLst>
               <a:ext uri="{FF2B5EF4-FFF2-40B4-BE49-F238E27FC236}">
-                <a16:creationId xmlns:a16="http://schemas.microsoft.com/office/drawing/2014/main" id="{A6DAEB2D-AFAE-E497-6DD9-45735E1835FA}"/>
+                <a16:creationId xmlns:a16="http://schemas.microsoft.com/office/drawing/2014/main" id="{069F29A1-6939-55C7-EE72-28102F3652E8}"/>
               </a:ext>
             </a:extLst>
           </p:cNvPr>
@@ -40580,8 +40736,8 @@
         </p:blipFill>
         <p:spPr bwMode="auto">
           <a:xfrm>
-            <a:off x="2206625" y="0"/>
-            <a:ext cx="7777163" cy="6858000"/>
+            <a:off x="2805113" y="0"/>
+            <a:ext cx="6581775" cy="6858000"/>
           </a:xfrm>
           <a:prstGeom prst="rect">
             <a:avLst/>
@@ -40601,7 +40757,7 @@
     </p:spTree>
     <p:extLst>
       <p:ext uri="{BB962C8B-B14F-4D97-AF65-F5344CB8AC3E}">
-        <p14:creationId xmlns:p14="http://schemas.microsoft.com/office/powerpoint/2010/main" val="978110786"/>
+        <p14:creationId xmlns:p14="http://schemas.microsoft.com/office/powerpoint/2010/main" val="2730550145"/>
       </p:ext>
     </p:extLst>
   </p:cSld>

</xml_diff>